<commit_message>
new_version ppt for model glm
</commit_message>
<xml_diff>
--- a/docs/yuchun_model.pptx
+++ b/docs/yuchun_model.pptx
@@ -12,17 +12,17 @@
     <p:sldId id="259" r:id="rId6"/>
     <p:sldId id="260" r:id="rId7"/>
     <p:sldId id="276" r:id="rId8"/>
-    <p:sldId id="280" r:id="rId9"/>
-    <p:sldId id="282" r:id="rId10"/>
-    <p:sldId id="284" r:id="rId11"/>
-    <p:sldId id="273" r:id="rId12"/>
-    <p:sldId id="270" r:id="rId13"/>
-    <p:sldId id="264" r:id="rId14"/>
-    <p:sldId id="272" r:id="rId15"/>
-    <p:sldId id="275" r:id="rId16"/>
-    <p:sldId id="278" r:id="rId17"/>
-    <p:sldId id="279" r:id="rId18"/>
-    <p:sldId id="261" r:id="rId19"/>
+    <p:sldId id="285" r:id="rId9"/>
+    <p:sldId id="280" r:id="rId10"/>
+    <p:sldId id="282" r:id="rId11"/>
+    <p:sldId id="284" r:id="rId12"/>
+    <p:sldId id="286" r:id="rId13"/>
+    <p:sldId id="270" r:id="rId14"/>
+    <p:sldId id="264" r:id="rId15"/>
+    <p:sldId id="272" r:id="rId16"/>
+    <p:sldId id="275" r:id="rId17"/>
+    <p:sldId id="278" r:id="rId18"/>
+    <p:sldId id="279" r:id="rId19"/>
     <p:sldId id="262" r:id="rId20"/>
     <p:sldId id="263" r:id="rId21"/>
   </p:sldIdLst>
@@ -3819,42 +3819,48 @@
         </p:nvSpPr>
         <p:spPr/>
         <p:txBody>
-          <a:bodyPr/>
+          <a:bodyPr>
+            <a:normAutofit/>
+          </a:bodyPr>
           <a:lstStyle/>
           <a:p>
             <a:r>
               <a:rPr lang="en-US" altLang="zh-TW" dirty="0" smtClean="0"/>
-              <a:t>Process : (tries)</a:t>
+              <a:t>Process :  (a small mistake, so only train fold one data </a:t>
+            </a:r>
+            <a:r>
+              <a:rPr lang="en-US" altLang="zh-TW" dirty="0" smtClean="0"/>
+              <a:t>within</a:t>
+            </a:r>
+            <a:r>
+              <a:rPr lang="en-US" altLang="zh-TW" dirty="0" smtClean="0"/>
+              <a:t> </a:t>
+            </a:r>
+            <a:r>
+              <a:rPr lang="en-US" altLang="zh-TW" dirty="0" smtClean="0"/>
+              <a:t>5 fold)</a:t>
             </a:r>
           </a:p>
           <a:p>
             <a:pPr lvl="1"/>
             <a:r>
               <a:rPr lang="en-US" altLang="zh-TW" dirty="0" smtClean="0"/>
-              <a:t>One hot encoding</a:t>
+              <a:t>feature </a:t>
+            </a:r>
+            <a:r>
+              <a:rPr lang="en-US" altLang="zh-TW" dirty="0" smtClean="0"/>
+              <a:t> </a:t>
             </a:r>
           </a:p>
           <a:p>
             <a:pPr lvl="2"/>
-            <a:r>
-              <a:rPr lang="en-US" altLang="zh-TW" dirty="0" smtClean="0"/>
-              <a:t>(</a:t>
-            </a:r>
             <a:r>
               <a:rPr lang="en-US" altLang="zh-TW" dirty="0" err="1" smtClean="0"/>
               <a:t>chest_pain</a:t>
             </a:r>
             <a:r>
               <a:rPr lang="en-US" altLang="zh-TW" dirty="0" smtClean="0"/>
-              <a:t>, </a:t>
-            </a:r>
-            <a:r>
-              <a:rPr lang="en-US" altLang="zh-TW" dirty="0" err="1" smtClean="0"/>
-              <a:t>ecg</a:t>
-            </a:r>
-            <a:r>
-              <a:rPr lang="en-US" altLang="zh-TW" dirty="0" smtClean="0"/>
-              <a:t>, slope, </a:t>
+              <a:t> + vessels + </a:t>
             </a:r>
             <a:r>
               <a:rPr lang="en-US" altLang="zh-TW" dirty="0" err="1" smtClean="0"/>
@@ -3862,85 +3868,119 @@
             </a:r>
             <a:r>
               <a:rPr lang="en-US" altLang="zh-TW" dirty="0" smtClean="0"/>
-              <a:t>)</a:t>
-            </a:r>
+              <a:t> + </a:t>
+            </a:r>
+            <a:r>
+              <a:rPr lang="en-US" altLang="zh-TW" dirty="0" err="1" smtClean="0"/>
+              <a:t>resting_bp</a:t>
+            </a:r>
+            <a:r>
+              <a:rPr lang="en-US" altLang="zh-TW" dirty="0" smtClean="0"/>
+              <a:t> + </a:t>
+            </a:r>
+            <a:r>
+              <a:rPr lang="en-US" altLang="zh-TW" dirty="0" err="1" smtClean="0"/>
+              <a:t>max_rate</a:t>
+            </a:r>
+            <a:r>
+              <a:rPr lang="en-US" altLang="zh-TW" dirty="0" smtClean="0"/>
+              <a:t> </a:t>
+            </a:r>
+            <a:r>
+              <a:rPr lang="en-US" altLang="zh-TW" dirty="0" smtClean="0"/>
+              <a:t>(without doing any </a:t>
+            </a:r>
+            <a:r>
+              <a:rPr lang="en-US" altLang="zh-TW" dirty="0" smtClean="0"/>
+              <a:t>thing</a:t>
+            </a:r>
+            <a:endParaRPr lang="en-US" altLang="zh-TW" dirty="0" smtClean="0"/>
           </a:p>
           <a:p>
             <a:pPr lvl="1"/>
             <a:r>
               <a:rPr lang="en-US" altLang="zh-TW" dirty="0" smtClean="0"/>
-              <a:t>age   </a:t>
-            </a:r>
-          </a:p>
-          <a:p>
-            <a:pPr lvl="2"/>
+              <a:t>Public </a:t>
+            </a:r>
+            <a:r>
+              <a:rPr lang="en-US" altLang="zh-TW" dirty="0" smtClean="0"/>
+              <a:t>score</a:t>
+            </a:r>
             <a:r>
               <a:rPr lang="en-US" altLang="zh-TW" dirty="0"/>
-              <a:t>c</a:t>
-            </a:r>
+              <a:t>: 0.86363</a:t>
+            </a:r>
+          </a:p>
+          <a:p>
+            <a:pPr lvl="1"/>
             <a:r>
               <a:rPr lang="en-US" altLang="zh-TW" dirty="0" smtClean="0"/>
-              <a:t>ut into bins =&gt; </a:t>
-            </a:r>
-            <a:r>
-              <a:rPr lang="en-US" altLang="zh-TW" dirty="0" err="1" smtClean="0"/>
-              <a:t>nonsignificant</a:t>
+              <a:t>Private score: </a:t>
+            </a:r>
+            <a:r>
+              <a:rPr lang="en-US" altLang="zh-TW" dirty="0" smtClean="0"/>
+              <a:t>0.83018</a:t>
             </a:r>
             <a:endParaRPr lang="en-US" altLang="zh-TW" dirty="0" smtClean="0"/>
           </a:p>
           <a:p>
             <a:pPr lvl="1"/>
-            <a:r>
-              <a:rPr lang="en-US" altLang="zh-TW" dirty="0"/>
-              <a:t>l</a:t>
-            </a:r>
+            <a:endParaRPr lang="en-US" altLang="zh-TW" dirty="0" smtClean="0"/>
+          </a:p>
+          <a:p>
+            <a:pPr marL="457200" lvl="1" indent="0">
+              <a:buNone/>
+            </a:pPr>
             <a:r>
               <a:rPr lang="en-US" altLang="zh-TW" dirty="0" smtClean="0"/>
-              <a:t>inear combinations</a:t>
-            </a:r>
-          </a:p>
-          <a:p>
-            <a:pPr lvl="2"/>
-            <a:r>
-              <a:rPr lang="en-US" altLang="zh-TW" dirty="0"/>
-              <a:t>e</a:t>
-            </a:r>
-            <a:r>
-              <a:rPr lang="en-US" altLang="zh-TW" dirty="0" smtClean="0"/>
-              <a:t>xamine p-value</a:t>
+              <a:t>   </a:t>
             </a:r>
             <a:endParaRPr lang="zh-TW" altLang="en-US" dirty="0"/>
           </a:p>
         </p:txBody>
       </p:sp>
-      <p:pic>
-        <p:nvPicPr>
-          <p:cNvPr id="3" name="圖片 2"/>
-          <p:cNvPicPr>
-            <a:picLocks noChangeAspect="1"/>
-          </p:cNvPicPr>
+      <p:sp>
+        <p:nvSpPr>
+          <p:cNvPr id="3" name="文字方塊 2"/>
+          <p:cNvSpPr txBox="1"/>
           <p:nvPr/>
-        </p:nvPicPr>
-        <p:blipFill>
-          <a:blip r:embed="rId2"/>
-          <a:stretch>
-            <a:fillRect/>
-          </a:stretch>
-        </p:blipFill>
+        </p:nvSpPr>
         <p:spPr>
           <a:xfrm>
-            <a:off x="6253216" y="2315730"/>
-            <a:ext cx="5577902" cy="1500924"/>
+            <a:off x="1739154" y="4500283"/>
+            <a:ext cx="8014446" cy="369332"/>
           </a:xfrm>
           <a:prstGeom prst="rect">
             <a:avLst/>
           </a:prstGeom>
+          <a:noFill/>
         </p:spPr>
-      </p:pic>
+        <p:txBody>
+          <a:bodyPr wrap="square" rtlCol="0">
+            <a:spAutoFit/>
+          </a:bodyPr>
+          <a:lstStyle/>
+          <a:p>
+            <a:r>
+              <a:rPr lang="en-US" altLang="zh-TW" dirty="0" smtClean="0">
+                <a:solidFill>
+                  <a:srgbClr val="FF0000"/>
+                </a:solidFill>
+              </a:rPr>
+              <a:t>Accuracy is not always the best choice to choose the test mode !!!! </a:t>
+            </a:r>
+            <a:endParaRPr lang="zh-TW" altLang="en-US" dirty="0">
+              <a:solidFill>
+                <a:srgbClr val="FF0000"/>
+              </a:solidFill>
+            </a:endParaRPr>
+          </a:p>
+        </p:txBody>
+      </p:sp>
     </p:spTree>
     <p:extLst>
       <p:ext uri="{BB962C8B-B14F-4D97-AF65-F5344CB8AC3E}">
-        <p14:creationId xmlns:p14="http://schemas.microsoft.com/office/powerpoint/2010/main" val="3864489285"/>
+        <p14:creationId xmlns:p14="http://schemas.microsoft.com/office/powerpoint/2010/main" val="1117646216"/>
       </p:ext>
     </p:extLst>
   </p:cSld>
@@ -3976,158 +4016,15 @@
       </p:grpSpPr>
       <p:sp>
         <p:nvSpPr>
-          <p:cNvPr id="3" name="Content Placeholder 2">
-            <a:extLst>
-              <a:ext uri="{FF2B5EF4-FFF2-40B4-BE49-F238E27FC236}">
-                <a16:creationId xmlns:a16="http://schemas.microsoft.com/office/drawing/2014/main" id="{97F7C985-F283-3F42-A334-D18BFB328D95}"/>
-              </a:ext>
-            </a:extLst>
-          </p:cNvPr>
-          <p:cNvSpPr>
-            <a:spLocks noGrp="1"/>
-          </p:cNvSpPr>
-          <p:nvPr>
-            <p:ph idx="1"/>
+          <p:cNvPr id="2" name="標題 1"/>
+          <p:cNvSpPr>
+            <a:spLocks noGrp="1"/>
+          </p:cNvSpPr>
+          <p:nvPr>
+            <p:ph type="title"/>
           </p:nvPr>
         </p:nvSpPr>
         <p:spPr/>
-        <p:txBody>
-          <a:bodyPr/>
-          <a:lstStyle/>
-          <a:p>
-            <a:pPr lvl="2"/>
-            <a:r>
-              <a:rPr lang="en-US" altLang="zh-TW" dirty="0" err="1" smtClean="0"/>
-              <a:t>resting_bp_without_label</a:t>
-            </a:r>
-            <a:endParaRPr lang="en-US" altLang="zh-TW" dirty="0" smtClean="0"/>
-          </a:p>
-          <a:p>
-            <a:pPr lvl="3"/>
-            <a:r>
-              <a:rPr lang="zh-TW" altLang="en-US" dirty="0" smtClean="0"/>
-              <a:t>用</a:t>
-            </a:r>
-            <a:r>
-              <a:rPr lang="en-US" altLang="zh-TW" dirty="0" err="1" smtClean="0"/>
-              <a:t>kmeans</a:t>
-            </a:r>
-            <a:r>
-              <a:rPr lang="zh-TW" altLang="en-US" dirty="0" smtClean="0"/>
-              <a:t> 跑區間</a:t>
-            </a:r>
-            <a:endParaRPr lang="en-US" altLang="zh-TW" dirty="0" smtClean="0"/>
-          </a:p>
-          <a:p>
-            <a:pPr lvl="3"/>
-            <a:r>
-              <a:rPr lang="zh-TW" altLang="en-US" dirty="0" smtClean="0"/>
-              <a:t>最後分出</a:t>
-            </a:r>
-            <a:r>
-              <a:rPr lang="en-US" altLang="zh-TW" dirty="0" smtClean="0"/>
-              <a:t>5</a:t>
-            </a:r>
-            <a:r>
-              <a:rPr lang="zh-TW" altLang="en-US" dirty="0" smtClean="0"/>
-              <a:t>個區間</a:t>
-            </a:r>
-            <a:r>
-              <a:rPr lang="en-US" altLang="zh-TW" dirty="0" smtClean="0"/>
-              <a:t>:</a:t>
-            </a:r>
-          </a:p>
-          <a:p>
-            <a:pPr lvl="4"/>
-            <a:r>
-              <a:rPr lang="en-US" altLang="zh-TW" dirty="0" smtClean="0"/>
-              <a:t>(</a:t>
-            </a:r>
-            <a:r>
-              <a:rPr lang="en-US" altLang="zh-TW" dirty="0"/>
-              <a:t>93, 113, 133, 160, 192</a:t>
-            </a:r>
-            <a:r>
-              <a:rPr lang="en-US" altLang="zh-TW" dirty="0" smtClean="0"/>
-              <a:t>)</a:t>
-            </a:r>
-          </a:p>
-          <a:p>
-            <a:pPr lvl="2"/>
-            <a:r>
-              <a:rPr lang="en-US" altLang="zh-TW" dirty="0" err="1" smtClean="0"/>
-              <a:t>slope_label</a:t>
-            </a:r>
-            <a:endParaRPr lang="en-US" altLang="zh-TW" dirty="0" smtClean="0"/>
-          </a:p>
-          <a:p>
-            <a:pPr lvl="3"/>
-            <a:r>
-              <a:rPr lang="en-US" altLang="zh-TW" dirty="0"/>
-              <a:t>o</a:t>
-            </a:r>
-            <a:r>
-              <a:rPr lang="en-US" altLang="zh-TW" dirty="0" smtClean="0"/>
-              <a:t>rigin category: 0,1,2</a:t>
-            </a:r>
-          </a:p>
-          <a:p>
-            <a:pPr lvl="3"/>
-            <a:r>
-              <a:rPr lang="en-US" altLang="zh-TW" dirty="0" smtClean="0"/>
-              <a:t>Since distribution like the table below</a:t>
-            </a:r>
-          </a:p>
-          <a:p>
-            <a:pPr lvl="4"/>
-            <a:r>
-              <a:rPr lang="en-US" altLang="zh-TW" dirty="0"/>
-              <a:t>c</a:t>
-            </a:r>
-            <a:r>
-              <a:rPr lang="en-US" altLang="zh-TW" dirty="0" smtClean="0"/>
-              <a:t>ategory = 0 =&gt; 0</a:t>
-            </a:r>
-          </a:p>
-          <a:p>
-            <a:pPr lvl="4"/>
-            <a:r>
-              <a:rPr lang="en-US" altLang="zh-TW" dirty="0"/>
-              <a:t>c</a:t>
-            </a:r>
-            <a:r>
-              <a:rPr lang="en-US" altLang="zh-TW" dirty="0" smtClean="0"/>
-              <a:t>ategory = 1,2 =&gt; 1</a:t>
-            </a:r>
-          </a:p>
-          <a:p>
-            <a:pPr lvl="3"/>
-            <a:endParaRPr lang="en-US" altLang="zh-TW" dirty="0"/>
-          </a:p>
-        </p:txBody>
-      </p:sp>
-      <p:sp>
-        <p:nvSpPr>
-          <p:cNvPr id="7" name="Title 1">
-            <a:extLst>
-              <a:ext uri="{FF2B5EF4-FFF2-40B4-BE49-F238E27FC236}">
-                <a16:creationId xmlns:a16="http://schemas.microsoft.com/office/drawing/2014/main" id="{00ADFE7D-9DD7-4F4B-A3EE-AC01CF7FBC49}"/>
-              </a:ext>
-            </a:extLst>
-          </p:cNvPr>
-          <p:cNvSpPr>
-            <a:spLocks noGrp="1"/>
-          </p:cNvSpPr>
-          <p:nvPr>
-            <p:ph type="title"/>
-          </p:nvPr>
-        </p:nvSpPr>
-        <p:spPr>
-          <a:xfrm>
-            <a:off x="1451579" y="804519"/>
-            <a:ext cx="9603275" cy="1049235"/>
-          </a:xfrm>
-        </p:spPr>
         <p:txBody>
           <a:bodyPr>
             <a:normAutofit/>
@@ -4135,281 +4032,197 @@
           <a:lstStyle/>
           <a:p>
             <a:r>
-              <a:rPr lang="zh-CN" altLang="en-US" b="1" dirty="0"/>
+              <a:rPr lang="zh-CN" altLang="en-US" b="1" dirty="0">
+                <a:solidFill>
+                  <a:prstClr val="black"/>
+                </a:solidFill>
+              </a:rPr>
               <a:t>實驗方法</a:t>
             </a:r>
             <a:r>
-              <a:rPr lang="en-US" altLang="zh-CN" b="1" dirty="0"/>
+              <a:rPr lang="en-US" altLang="zh-CN" b="1" dirty="0">
+                <a:solidFill>
+                  <a:prstClr val="black"/>
+                </a:solidFill>
+              </a:rPr>
               <a:t/>
             </a:r>
             <a:br>
-              <a:rPr lang="en-US" altLang="zh-CN" b="1" dirty="0"/>
+              <a:rPr lang="en-US" altLang="zh-CN" b="1" dirty="0">
+                <a:solidFill>
+                  <a:prstClr val="black"/>
+                </a:solidFill>
+              </a:rPr>
             </a:br>
             <a:r>
-              <a:rPr lang="en-US" altLang="zh-CN" sz="1300" b="1" dirty="0"/>
+              <a:rPr lang="en-US" altLang="zh-CN" sz="1300" b="1" dirty="0">
+                <a:solidFill>
+                  <a:prstClr val="black"/>
+                </a:solidFill>
+              </a:rPr>
               <a:t/>
             </a:r>
             <a:br>
-              <a:rPr lang="en-US" altLang="zh-CN" sz="1300" b="1" dirty="0"/>
+              <a:rPr lang="en-US" altLang="zh-CN" sz="1300" b="1" dirty="0">
+                <a:solidFill>
+                  <a:prstClr val="black"/>
+                </a:solidFill>
+              </a:rPr>
             </a:br>
             <a:r>
-              <a:rPr lang="zh-CN" altLang="en-US" sz="2000" b="1" dirty="0" smtClean="0"/>
+              <a:rPr lang="zh-CN" altLang="en-US" sz="2000" b="1" dirty="0">
+                <a:solidFill>
+                  <a:prstClr val="black"/>
+                </a:solidFill>
+              </a:rPr>
               <a:t>模型</a:t>
             </a:r>
             <a:r>
-              <a:rPr lang="zh-TW" altLang="en-US" sz="2000" b="1" dirty="0" smtClean="0"/>
+              <a:rPr lang="zh-TW" altLang="en-US" sz="2000" b="1" dirty="0">
+                <a:solidFill>
+                  <a:prstClr val="black"/>
+                </a:solidFill>
+              </a:rPr>
               <a:t> </a:t>
             </a:r>
             <a:r>
-              <a:rPr lang="en-US" altLang="zh-TW" sz="2000" b="1" dirty="0" smtClean="0"/>
-              <a:t>– logistic regression (FINAL</a:t>
-            </a:r>
-            <a:endParaRPr lang="en-US" altLang="zh-CN" sz="2000" b="1" dirty="0"/>
-          </a:p>
-        </p:txBody>
-      </p:sp>
-      <p:graphicFrame>
-        <p:nvGraphicFramePr>
-          <p:cNvPr id="4" name="表格 3"/>
-          <p:cNvGraphicFramePr>
-            <a:graphicFrameLocks noGrp="1"/>
-          </p:cNvGraphicFramePr>
-          <p:nvPr/>
-        </p:nvGraphicFramePr>
-        <p:xfrm>
-          <a:off x="7288493" y="4096872"/>
-          <a:ext cx="3714375" cy="1463040"/>
-        </p:xfrm>
-        <a:graphic>
-          <a:graphicData uri="http://schemas.openxmlformats.org/drawingml/2006/table">
-            <a:tbl>
-              <a:tblPr firstRow="1" bandRow="1">
-                <a:tableStyleId>{616DA210-FB5B-4158-B5E0-FEB733F419BA}</a:tableStyleId>
-              </a:tblPr>
-              <a:tblGrid>
-                <a:gridCol w="1238125">
-                  <a:extLst>
-                    <a:ext uri="{9D8B030D-6E8A-4147-A177-3AD203B41FA5}">
-                      <a16:colId xmlns:a16="http://schemas.microsoft.com/office/drawing/2014/main" val="1456737520"/>
-                    </a:ext>
-                  </a:extLst>
-                </a:gridCol>
-                <a:gridCol w="1238125">
-                  <a:extLst>
-                    <a:ext uri="{9D8B030D-6E8A-4147-A177-3AD203B41FA5}">
-                      <a16:colId xmlns:a16="http://schemas.microsoft.com/office/drawing/2014/main" val="2168962393"/>
-                    </a:ext>
-                  </a:extLst>
-                </a:gridCol>
-                <a:gridCol w="1238125">
-                  <a:extLst>
-                    <a:ext uri="{9D8B030D-6E8A-4147-A177-3AD203B41FA5}">
-                      <a16:colId xmlns:a16="http://schemas.microsoft.com/office/drawing/2014/main" val="262699294"/>
-                    </a:ext>
-                  </a:extLst>
-                </a:gridCol>
-              </a:tblGrid>
-              <a:tr h="272494">
-                <a:tc>
-                  <a:txBody>
-                    <a:bodyPr/>
-                    <a:lstStyle/>
-                    <a:p>
-                      <a:endParaRPr lang="zh-TW" altLang="en-US" dirty="0"/>
-                    </a:p>
-                  </a:txBody>
-                  <a:tcPr/>
-                </a:tc>
-                <a:tc>
-                  <a:txBody>
-                    <a:bodyPr/>
-                    <a:lstStyle/>
-                    <a:p>
-                      <a:pPr algn="ctr"/>
-                      <a:r>
-                        <a:rPr lang="en-US" altLang="zh-TW" sz="1400" b="0" dirty="0" smtClean="0"/>
-                        <a:t>slope</a:t>
-                      </a:r>
-                      <a:endParaRPr lang="zh-TW" altLang="en-US" sz="1400" b="0" dirty="0"/>
-                    </a:p>
-                  </a:txBody>
-                  <a:tcPr/>
-                </a:tc>
-                <a:tc>
-                  <a:txBody>
-                    <a:bodyPr/>
-                    <a:lstStyle/>
-                    <a:p>
-                      <a:r>
-                        <a:rPr lang="en-US" altLang="zh-TW" sz="1400" b="0" dirty="0" err="1" smtClean="0"/>
-                        <a:t>Heart_disease</a:t>
-                      </a:r>
-                      <a:endParaRPr lang="zh-TW" altLang="en-US" sz="1400" b="0" dirty="0"/>
-                    </a:p>
-                  </a:txBody>
-                  <a:tcPr/>
-                </a:tc>
-                <a:extLst>
-                  <a:ext uri="{0D108BD9-81ED-4DB2-BD59-A6C34878D82A}">
-                    <a16:rowId xmlns:a16="http://schemas.microsoft.com/office/drawing/2014/main" val="2578437637"/>
-                  </a:ext>
-                </a:extLst>
-              </a:tr>
-              <a:tr h="272494">
-                <a:tc>
-                  <a:txBody>
-                    <a:bodyPr/>
-                    <a:lstStyle/>
-                    <a:p>
-                      <a:r>
-                        <a:rPr lang="en-US" altLang="zh-TW" dirty="0" smtClean="0"/>
-                        <a:t>0</a:t>
-                      </a:r>
-                      <a:endParaRPr lang="zh-TW" altLang="en-US" dirty="0"/>
-                    </a:p>
-                  </a:txBody>
-                  <a:tcPr/>
-                </a:tc>
-                <a:tc>
-                  <a:txBody>
-                    <a:bodyPr/>
-                    <a:lstStyle/>
-                    <a:p>
-                      <a:r>
-                        <a:rPr lang="en-US" altLang="zh-TW" dirty="0" smtClean="0"/>
-                        <a:t>1</a:t>
-                      </a:r>
-                      <a:endParaRPr lang="zh-TW" altLang="en-US" dirty="0"/>
-                    </a:p>
-                  </a:txBody>
-                  <a:tcPr/>
-                </a:tc>
-                <a:tc>
-                  <a:txBody>
-                    <a:bodyPr/>
-                    <a:lstStyle/>
-                    <a:p>
-                      <a:r>
-                        <a:rPr lang="en-US" altLang="zh-TW" dirty="0" smtClean="0"/>
-                        <a:t>0.283</a:t>
-                      </a:r>
-                      <a:endParaRPr lang="zh-TW" altLang="en-US" dirty="0"/>
-                    </a:p>
-                  </a:txBody>
-                  <a:tcPr/>
-                </a:tc>
-                <a:extLst>
-                  <a:ext uri="{0D108BD9-81ED-4DB2-BD59-A6C34878D82A}">
-                    <a16:rowId xmlns:a16="http://schemas.microsoft.com/office/drawing/2014/main" val="1028474488"/>
-                  </a:ext>
-                </a:extLst>
-              </a:tr>
-              <a:tr h="272494">
-                <a:tc>
-                  <a:txBody>
-                    <a:bodyPr/>
-                    <a:lstStyle/>
-                    <a:p>
-                      <a:r>
-                        <a:rPr lang="en-US" altLang="zh-TW" dirty="0" smtClean="0"/>
-                        <a:t>1</a:t>
-                      </a:r>
-                      <a:endParaRPr lang="zh-TW" altLang="en-US" dirty="0"/>
-                    </a:p>
-                  </a:txBody>
-                  <a:tcPr/>
-                </a:tc>
-                <a:tc>
-                  <a:txBody>
-                    <a:bodyPr/>
-                    <a:lstStyle/>
-                    <a:p>
-                      <a:r>
-                        <a:rPr lang="en-US" altLang="zh-TW" dirty="0" smtClean="0"/>
-                        <a:t>2</a:t>
-                      </a:r>
-                      <a:endParaRPr lang="zh-TW" altLang="en-US" dirty="0"/>
-                    </a:p>
-                  </a:txBody>
-                  <a:tcPr/>
-                </a:tc>
-                <a:tc>
-                  <a:txBody>
-                    <a:bodyPr/>
-                    <a:lstStyle/>
-                    <a:p>
-                      <a:r>
-                        <a:rPr lang="en-US" altLang="zh-TW" dirty="0" smtClean="0"/>
-                        <a:t>0.657</a:t>
-                      </a:r>
-                      <a:endParaRPr lang="zh-TW" altLang="en-US" dirty="0"/>
-                    </a:p>
-                  </a:txBody>
-                  <a:tcPr/>
-                </a:tc>
-                <a:extLst>
-                  <a:ext uri="{0D108BD9-81ED-4DB2-BD59-A6C34878D82A}">
-                    <a16:rowId xmlns:a16="http://schemas.microsoft.com/office/drawing/2014/main" val="2074591252"/>
-                  </a:ext>
-                </a:extLst>
-              </a:tr>
-              <a:tr h="272494">
-                <a:tc>
-                  <a:txBody>
-                    <a:bodyPr/>
-                    <a:lstStyle/>
-                    <a:p>
-                      <a:r>
-                        <a:rPr lang="en-US" altLang="zh-TW" dirty="0" smtClean="0"/>
-                        <a:t>2</a:t>
-                      </a:r>
-                      <a:endParaRPr lang="zh-TW" altLang="en-US" dirty="0"/>
-                    </a:p>
-                  </a:txBody>
-                  <a:tcPr/>
-                </a:tc>
-                <a:tc>
-                  <a:txBody>
-                    <a:bodyPr/>
-                    <a:lstStyle/>
-                    <a:p>
-                      <a:r>
-                        <a:rPr lang="en-US" altLang="zh-TW" dirty="0" smtClean="0"/>
-                        <a:t>3</a:t>
-                      </a:r>
-                      <a:endParaRPr lang="zh-TW" altLang="en-US" dirty="0"/>
-                    </a:p>
-                  </a:txBody>
-                  <a:tcPr/>
-                </a:tc>
-                <a:tc>
-                  <a:txBody>
-                    <a:bodyPr/>
-                    <a:lstStyle/>
-                    <a:p>
-                      <a:r>
-                        <a:rPr lang="en-US" altLang="zh-TW" dirty="0" smtClean="0"/>
-                        <a:t>0.500</a:t>
-                      </a:r>
-                      <a:endParaRPr lang="zh-TW" altLang="en-US" dirty="0"/>
-                    </a:p>
-                  </a:txBody>
-                  <a:tcPr/>
-                </a:tc>
-                <a:extLst>
-                  <a:ext uri="{0D108BD9-81ED-4DB2-BD59-A6C34878D82A}">
-                    <a16:rowId xmlns:a16="http://schemas.microsoft.com/office/drawing/2014/main" val="2538231801"/>
-                  </a:ext>
-                </a:extLst>
-              </a:tr>
-            </a:tbl>
-          </a:graphicData>
-        </a:graphic>
-      </p:graphicFrame>
+              <a:rPr lang="en-US" altLang="zh-TW" sz="2000" b="1" dirty="0">
+                <a:solidFill>
+                  <a:prstClr val="black"/>
+                </a:solidFill>
+              </a:rPr>
+              <a:t>– logistic regression </a:t>
+            </a:r>
+            <a:endParaRPr lang="zh-TW" altLang="en-US" dirty="0"/>
+          </a:p>
+        </p:txBody>
+      </p:sp>
+      <p:sp>
+        <p:nvSpPr>
+          <p:cNvPr id="6" name="內容版面配置區 5"/>
+          <p:cNvSpPr>
+            <a:spLocks noGrp="1"/>
+          </p:cNvSpPr>
+          <p:nvPr>
+            <p:ph idx="1"/>
+          </p:nvPr>
+        </p:nvSpPr>
+        <p:spPr/>
+        <p:txBody>
+          <a:bodyPr/>
+          <a:lstStyle/>
+          <a:p>
+            <a:r>
+              <a:rPr lang="en-US" altLang="zh-TW" dirty="0" smtClean="0"/>
+              <a:t>Process : (tries)</a:t>
+            </a:r>
+          </a:p>
+          <a:p>
+            <a:pPr lvl="1"/>
+            <a:r>
+              <a:rPr lang="en-US" altLang="zh-TW" dirty="0" smtClean="0"/>
+              <a:t>One hot encoding</a:t>
+            </a:r>
+          </a:p>
+          <a:p>
+            <a:pPr lvl="2"/>
+            <a:r>
+              <a:rPr lang="en-US" altLang="zh-TW" dirty="0" smtClean="0"/>
+              <a:t>(</a:t>
+            </a:r>
+            <a:r>
+              <a:rPr lang="en-US" altLang="zh-TW" dirty="0" err="1" smtClean="0"/>
+              <a:t>chest_pain</a:t>
+            </a:r>
+            <a:r>
+              <a:rPr lang="en-US" altLang="zh-TW" dirty="0" smtClean="0"/>
+              <a:t>, </a:t>
+            </a:r>
+            <a:r>
+              <a:rPr lang="en-US" altLang="zh-TW" dirty="0" err="1" smtClean="0"/>
+              <a:t>ecg</a:t>
+            </a:r>
+            <a:r>
+              <a:rPr lang="en-US" altLang="zh-TW" dirty="0" smtClean="0"/>
+              <a:t>, slope, </a:t>
+            </a:r>
+            <a:r>
+              <a:rPr lang="en-US" altLang="zh-TW" dirty="0" err="1" smtClean="0"/>
+              <a:t>thalium_scan</a:t>
+            </a:r>
+            <a:r>
+              <a:rPr lang="en-US" altLang="zh-TW" dirty="0" smtClean="0"/>
+              <a:t>)</a:t>
+            </a:r>
+          </a:p>
+          <a:p>
+            <a:pPr lvl="2"/>
+            <a:r>
+              <a:rPr lang="en-US" altLang="zh-TW" dirty="0"/>
+              <a:t>c</a:t>
+            </a:r>
+            <a:r>
+              <a:rPr lang="en-US" altLang="zh-TW" dirty="0" smtClean="0"/>
+              <a:t>onsider </a:t>
+            </a:r>
+            <a:r>
+              <a:rPr lang="en-US" altLang="zh-TW" dirty="0" err="1" smtClean="0"/>
+              <a:t>seperately</a:t>
+            </a:r>
+            <a:endParaRPr lang="en-US" altLang="zh-TW" dirty="0" smtClean="0"/>
+          </a:p>
+          <a:p>
+            <a:pPr lvl="1"/>
+            <a:r>
+              <a:rPr lang="en-US" altLang="zh-TW" dirty="0" smtClean="0"/>
+              <a:t>age   </a:t>
+            </a:r>
+          </a:p>
+          <a:p>
+            <a:pPr lvl="2"/>
+            <a:r>
+              <a:rPr lang="en-US" altLang="zh-TW" dirty="0"/>
+              <a:t>c</a:t>
+            </a:r>
+            <a:r>
+              <a:rPr lang="en-US" altLang="zh-TW" dirty="0" smtClean="0"/>
+              <a:t>ut into bins =&gt; </a:t>
+            </a:r>
+            <a:r>
+              <a:rPr lang="en-US" altLang="zh-TW" dirty="0" err="1" smtClean="0"/>
+              <a:t>nonsignificant</a:t>
+            </a:r>
+            <a:endParaRPr lang="en-US" altLang="zh-TW" dirty="0" smtClean="0"/>
+          </a:p>
+          <a:p>
+            <a:pPr lvl="1"/>
+            <a:r>
+              <a:rPr lang="en-US" altLang="zh-TW" dirty="0"/>
+              <a:t>l</a:t>
+            </a:r>
+            <a:r>
+              <a:rPr lang="en-US" altLang="zh-TW" dirty="0" smtClean="0"/>
+              <a:t>inear combinations</a:t>
+            </a:r>
+          </a:p>
+          <a:p>
+            <a:pPr lvl="2"/>
+            <a:r>
+              <a:rPr lang="en-US" altLang="zh-TW" dirty="0"/>
+              <a:t>e</a:t>
+            </a:r>
+            <a:r>
+              <a:rPr lang="en-US" altLang="zh-TW" dirty="0" smtClean="0"/>
+              <a:t>xamine p-value</a:t>
+            </a:r>
+            <a:endParaRPr lang="zh-TW" altLang="en-US" dirty="0"/>
+          </a:p>
+        </p:txBody>
+      </p:sp>
     </p:spTree>
     <p:extLst>
       <p:ext uri="{BB962C8B-B14F-4D97-AF65-F5344CB8AC3E}">
-        <p14:creationId xmlns:p14="http://schemas.microsoft.com/office/powerpoint/2010/main" val="3877329747"/>
+        <p14:creationId xmlns:p14="http://schemas.microsoft.com/office/powerpoint/2010/main" val="3864489285"/>
       </p:ext>
     </p:extLst>
   </p:cSld>
@@ -4427,6 +4240,605 @@
 </file>
 
 <file path=ppt/slides/slide12.xml><?xml version="1.0" encoding="utf-8"?>
+<p:sld xmlns:a="http://schemas.openxmlformats.org/drawingml/2006/main" xmlns:r="http://schemas.openxmlformats.org/officeDocument/2006/relationships" xmlns:p="http://schemas.openxmlformats.org/presentationml/2006/main">
+  <p:cSld>
+    <p:spTree>
+      <p:nvGrpSpPr>
+        <p:cNvPr id="1" name=""/>
+        <p:cNvGrpSpPr/>
+        <p:nvPr/>
+      </p:nvGrpSpPr>
+      <p:grpSpPr>
+        <a:xfrm>
+          <a:off x="0" y="0"/>
+          <a:ext cx="0" cy="0"/>
+          <a:chOff x="0" y="0"/>
+          <a:chExt cx="0" cy="0"/>
+        </a:xfrm>
+      </p:grpSpPr>
+      <p:sp>
+        <p:nvSpPr>
+          <p:cNvPr id="2" name="標題 1"/>
+          <p:cNvSpPr>
+            <a:spLocks noGrp="1"/>
+          </p:cNvSpPr>
+          <p:nvPr>
+            <p:ph type="title"/>
+          </p:nvPr>
+        </p:nvSpPr>
+        <p:spPr/>
+        <p:txBody>
+          <a:bodyPr/>
+          <a:lstStyle/>
+          <a:p>
+            <a:r>
+              <a:rPr lang="zh-CN" altLang="en-US" b="1" dirty="0">
+                <a:solidFill>
+                  <a:prstClr val="black"/>
+                </a:solidFill>
+              </a:rPr>
+              <a:t>實驗方法</a:t>
+            </a:r>
+            <a:r>
+              <a:rPr lang="en-US" altLang="zh-CN" b="1" dirty="0">
+                <a:solidFill>
+                  <a:prstClr val="black"/>
+                </a:solidFill>
+              </a:rPr>
+              <a:t/>
+            </a:r>
+            <a:br>
+              <a:rPr lang="en-US" altLang="zh-CN" b="1" dirty="0">
+                <a:solidFill>
+                  <a:prstClr val="black"/>
+                </a:solidFill>
+              </a:rPr>
+            </a:br>
+            <a:r>
+              <a:rPr lang="en-US" altLang="zh-CN" sz="1300" b="1" dirty="0">
+                <a:solidFill>
+                  <a:prstClr val="black"/>
+                </a:solidFill>
+              </a:rPr>
+              <a:t/>
+            </a:r>
+            <a:br>
+              <a:rPr lang="en-US" altLang="zh-CN" sz="1300" b="1" dirty="0">
+                <a:solidFill>
+                  <a:prstClr val="black"/>
+                </a:solidFill>
+              </a:rPr>
+            </a:br>
+            <a:r>
+              <a:rPr lang="zh-CN" altLang="en-US" sz="2000" b="1" dirty="0">
+                <a:solidFill>
+                  <a:prstClr val="black"/>
+                </a:solidFill>
+              </a:rPr>
+              <a:t>模型</a:t>
+            </a:r>
+            <a:r>
+              <a:rPr lang="zh-TW" altLang="en-US" sz="2000" b="1" dirty="0">
+                <a:solidFill>
+                  <a:prstClr val="black"/>
+                </a:solidFill>
+              </a:rPr>
+              <a:t> </a:t>
+            </a:r>
+            <a:r>
+              <a:rPr lang="en-US" altLang="zh-TW" sz="2000" b="1" dirty="0">
+                <a:solidFill>
+                  <a:prstClr val="black"/>
+                </a:solidFill>
+              </a:rPr>
+              <a:t>– logistic regression </a:t>
+            </a:r>
+            <a:endParaRPr lang="zh-TW" altLang="en-US" dirty="0"/>
+          </a:p>
+        </p:txBody>
+      </p:sp>
+      <p:sp>
+        <p:nvSpPr>
+          <p:cNvPr id="5" name="內容版面配置區 4"/>
+          <p:cNvSpPr>
+            <a:spLocks noGrp="1"/>
+          </p:cNvSpPr>
+          <p:nvPr>
+            <p:ph idx="1"/>
+          </p:nvPr>
+        </p:nvSpPr>
+        <p:spPr/>
+        <p:txBody>
+          <a:bodyPr/>
+          <a:lstStyle/>
+          <a:p>
+            <a:r>
+              <a:rPr lang="en-US" altLang="zh-TW" dirty="0" smtClean="0"/>
+              <a:t>Performance about </a:t>
+            </a:r>
+            <a:r>
+              <a:rPr lang="en-US" altLang="zh-TW" dirty="0" err="1" smtClean="0"/>
+              <a:t>ont</a:t>
+            </a:r>
+            <a:r>
+              <a:rPr lang="en-US" altLang="zh-TW" dirty="0" smtClean="0"/>
+              <a:t> - hot encoding:</a:t>
+            </a:r>
+            <a:endParaRPr lang="zh-TW" altLang="en-US" dirty="0"/>
+          </a:p>
+        </p:txBody>
+      </p:sp>
+      <p:graphicFrame>
+        <p:nvGraphicFramePr>
+          <p:cNvPr id="4" name="表格 3"/>
+          <p:cNvGraphicFramePr>
+            <a:graphicFrameLocks noGrp="1"/>
+          </p:cNvGraphicFramePr>
+          <p:nvPr>
+            <p:extLst>
+              <p:ext uri="{D42A27DB-BD31-4B8C-83A1-F6EECF244321}">
+                <p14:modId xmlns:p14="http://schemas.microsoft.com/office/powerpoint/2010/main" val="1288186572"/>
+              </p:ext>
+            </p:extLst>
+          </p:nvPr>
+        </p:nvGraphicFramePr>
+        <p:xfrm>
+          <a:off x="947344" y="2803640"/>
+          <a:ext cx="10611743" cy="3083746"/>
+        </p:xfrm>
+        <a:graphic>
+          <a:graphicData uri="http://schemas.openxmlformats.org/drawingml/2006/table">
+            <a:tbl>
+              <a:tblPr firstRow="1" bandRow="1">
+                <a:tableStyleId>{5C22544A-7EE6-4342-B048-85BDC9FD1C3A}</a:tableStyleId>
+              </a:tblPr>
+              <a:tblGrid>
+                <a:gridCol w="7011743">
+                  <a:extLst>
+                    <a:ext uri="{9D8B030D-6E8A-4147-A177-3AD203B41FA5}">
+                      <a16:colId xmlns:a16="http://schemas.microsoft.com/office/drawing/2014/main" val="1321070204"/>
+                    </a:ext>
+                  </a:extLst>
+                </a:gridCol>
+                <a:gridCol w="1800000">
+                  <a:extLst>
+                    <a:ext uri="{9D8B030D-6E8A-4147-A177-3AD203B41FA5}">
+                      <a16:colId xmlns:a16="http://schemas.microsoft.com/office/drawing/2014/main" val="1763845849"/>
+                    </a:ext>
+                  </a:extLst>
+                </a:gridCol>
+                <a:gridCol w="1800000">
+                  <a:extLst>
+                    <a:ext uri="{9D8B030D-6E8A-4147-A177-3AD203B41FA5}">
+                      <a16:colId xmlns:a16="http://schemas.microsoft.com/office/drawing/2014/main" val="2747210411"/>
+                    </a:ext>
+                  </a:extLst>
+                </a:gridCol>
+              </a:tblGrid>
+              <a:tr h="460357">
+                <a:tc>
+                  <a:txBody>
+                    <a:bodyPr/>
+                    <a:lstStyle/>
+                    <a:p>
+                      <a:pPr algn="ctr"/>
+                      <a:r>
+                        <a:rPr lang="en-US" altLang="zh-TW" dirty="0" smtClean="0"/>
+                        <a:t>features</a:t>
+                      </a:r>
+                      <a:endParaRPr lang="zh-TW" altLang="en-US" dirty="0"/>
+                    </a:p>
+                  </a:txBody>
+                  <a:tcPr/>
+                </a:tc>
+                <a:tc>
+                  <a:txBody>
+                    <a:bodyPr/>
+                    <a:lstStyle/>
+                    <a:p>
+                      <a:pPr algn="ctr"/>
+                      <a:r>
+                        <a:rPr lang="en-US" altLang="zh-TW" dirty="0" smtClean="0"/>
+                        <a:t>private score</a:t>
+                      </a:r>
+                      <a:endParaRPr lang="zh-TW" altLang="en-US" dirty="0"/>
+                    </a:p>
+                  </a:txBody>
+                  <a:tcPr/>
+                </a:tc>
+                <a:tc>
+                  <a:txBody>
+                    <a:bodyPr/>
+                    <a:lstStyle/>
+                    <a:p>
+                      <a:pPr algn="ctr"/>
+                      <a:r>
+                        <a:rPr lang="en-US" altLang="zh-TW" dirty="0" smtClean="0"/>
+                        <a:t>public</a:t>
+                      </a:r>
+                      <a:r>
+                        <a:rPr lang="en-US" altLang="zh-TW" baseline="0" dirty="0" smtClean="0"/>
+                        <a:t> score</a:t>
+                      </a:r>
+                      <a:endParaRPr lang="zh-TW" altLang="en-US" dirty="0"/>
+                    </a:p>
+                  </a:txBody>
+                  <a:tcPr/>
+                </a:tc>
+                <a:extLst>
+                  <a:ext uri="{0D108BD9-81ED-4DB2-BD59-A6C34878D82A}">
+                    <a16:rowId xmlns:a16="http://schemas.microsoft.com/office/drawing/2014/main" val="2424772356"/>
+                  </a:ext>
+                </a:extLst>
+              </a:tr>
+              <a:tr h="794589">
+                <a:tc>
+                  <a:txBody>
+                    <a:bodyPr/>
+                    <a:lstStyle/>
+                    <a:p>
+                      <a:pPr algn="ctr"/>
+                      <a:r>
+                        <a:rPr lang="en-US" altLang="zh-TW" dirty="0" err="1" smtClean="0"/>
+                        <a:t>resting_bp_without_label</a:t>
+                      </a:r>
+                      <a:r>
+                        <a:rPr lang="en-US" altLang="zh-TW" dirty="0" smtClean="0"/>
+                        <a:t> + </a:t>
+                      </a:r>
+                      <a:r>
+                        <a:rPr lang="en-US" altLang="zh-TW" dirty="0" err="1" smtClean="0"/>
+                        <a:t>slope_label</a:t>
+                      </a:r>
+                      <a:r>
+                        <a:rPr lang="en-US" altLang="zh-TW" dirty="0" smtClean="0"/>
+                        <a:t> + </a:t>
+                      </a:r>
+                      <a:r>
+                        <a:rPr lang="en-US" altLang="zh-TW" dirty="0" smtClean="0"/>
+                        <a:t>vessels + </a:t>
+                      </a:r>
+                      <a:r>
+                        <a:rPr lang="en-US" altLang="zh-TW" dirty="0" err="1" smtClean="0"/>
+                        <a:t>chest_pain</a:t>
+                      </a:r>
+                      <a:r>
+                        <a:rPr lang="en-US" altLang="zh-TW" dirty="0" smtClean="0"/>
+                        <a:t> + </a:t>
+                      </a:r>
+                      <a:r>
+                        <a:rPr lang="en-US" altLang="zh-TW" dirty="0" err="1" smtClean="0"/>
+                        <a:t>thalium_scan</a:t>
+                      </a:r>
+                      <a:r>
+                        <a:rPr lang="en-US" altLang="zh-TW" dirty="0" smtClean="0"/>
+                        <a:t>      </a:t>
+                      </a:r>
+                      <a:endParaRPr lang="zh-TW" altLang="en-US" dirty="0"/>
+                    </a:p>
+                  </a:txBody>
+                  <a:tcPr/>
+                </a:tc>
+                <a:tc>
+                  <a:txBody>
+                    <a:bodyPr/>
+                    <a:lstStyle/>
+                    <a:p>
+                      <a:pPr algn="ctr" fontAlgn="base"/>
+                      <a:r>
+                        <a:rPr lang="en-US" altLang="zh-TW" sz="1800" b="0" i="0" kern="1200" dirty="0" smtClean="0">
+                          <a:solidFill>
+                            <a:schemeClr val="dk1"/>
+                          </a:solidFill>
+                          <a:effectLst/>
+                          <a:latin typeface="+mn-lt"/>
+                          <a:ea typeface="+mn-ea"/>
+                          <a:cs typeface="+mn-cs"/>
+                        </a:rPr>
+                        <a:t>0.81132</a:t>
+                      </a:r>
+                    </a:p>
+                  </a:txBody>
+                  <a:tcPr/>
+                </a:tc>
+                <a:tc>
+                  <a:txBody>
+                    <a:bodyPr/>
+                    <a:lstStyle/>
+                    <a:p>
+                      <a:pPr algn="ctr" fontAlgn="base"/>
+                      <a:r>
+                        <a:rPr lang="en-US" altLang="zh-TW" sz="1800" b="0" i="0" kern="1200" dirty="0" smtClean="0">
+                          <a:solidFill>
+                            <a:schemeClr val="dk1"/>
+                          </a:solidFill>
+                          <a:effectLst/>
+                          <a:latin typeface="+mn-lt"/>
+                          <a:ea typeface="+mn-ea"/>
+                          <a:cs typeface="+mn-cs"/>
+                        </a:rPr>
+                        <a:t>0.90909</a:t>
+                      </a:r>
+                      <a:endParaRPr lang="en-US" altLang="zh-TW" sz="1800" b="0" i="0" kern="1200" dirty="0">
+                        <a:solidFill>
+                          <a:schemeClr val="dk1"/>
+                        </a:solidFill>
+                        <a:effectLst/>
+                        <a:latin typeface="+mn-lt"/>
+                        <a:ea typeface="+mn-ea"/>
+                        <a:cs typeface="+mn-cs"/>
+                      </a:endParaRPr>
+                    </a:p>
+                  </a:txBody>
+                  <a:tcPr/>
+                </a:tc>
+                <a:extLst>
+                  <a:ext uri="{0D108BD9-81ED-4DB2-BD59-A6C34878D82A}">
+                    <a16:rowId xmlns:a16="http://schemas.microsoft.com/office/drawing/2014/main" val="970882918"/>
+                  </a:ext>
+                </a:extLst>
+              </a:tr>
+              <a:tr h="794589">
+                <a:tc>
+                  <a:txBody>
+                    <a:bodyPr/>
+                    <a:lstStyle/>
+                    <a:p>
+                      <a:pPr marL="0" marR="0" indent="0" algn="ctr" defTabSz="914400" rtl="0" eaLnBrk="1" fontAlgn="auto" latinLnBrk="0" hangingPunct="1">
+                        <a:lnSpc>
+                          <a:spcPct val="100000"/>
+                        </a:lnSpc>
+                        <a:spcBef>
+                          <a:spcPts val="0"/>
+                        </a:spcBef>
+                        <a:spcAft>
+                          <a:spcPts val="0"/>
+                        </a:spcAft>
+                        <a:buClrTx/>
+                        <a:buSzTx/>
+                        <a:buFontTx/>
+                        <a:buNone/>
+                        <a:tabLst/>
+                        <a:defRPr/>
+                      </a:pPr>
+                      <a:r>
+                        <a:rPr lang="en-US" altLang="zh-TW" dirty="0" err="1" smtClean="0"/>
+                        <a:t>resting_bp_without_label</a:t>
+                      </a:r>
+                      <a:r>
+                        <a:rPr lang="en-US" altLang="zh-TW" dirty="0" smtClean="0"/>
+                        <a:t> + </a:t>
+                      </a:r>
+                      <a:r>
+                        <a:rPr lang="en-US" altLang="zh-TW" dirty="0" err="1" smtClean="0"/>
+                        <a:t>slope_label</a:t>
+                      </a:r>
+                      <a:r>
+                        <a:rPr lang="en-US" altLang="zh-TW" dirty="0" smtClean="0"/>
+                        <a:t> + </a:t>
+                      </a:r>
+                      <a:r>
+                        <a:rPr lang="en-US" altLang="zh-TW" dirty="0" smtClean="0"/>
+                        <a:t>vessels</a:t>
+                      </a:r>
+                      <a:r>
+                        <a:rPr lang="en-US" altLang="zh-TW" baseline="0" dirty="0" smtClean="0"/>
+                        <a:t> </a:t>
+                      </a:r>
+                      <a:r>
+                        <a:rPr lang="en-US" altLang="zh-TW" dirty="0" smtClean="0"/>
+                        <a:t>+ </a:t>
+                      </a:r>
+                      <a:r>
+                        <a:rPr lang="en-US" altLang="zh-TW" dirty="0" err="1" smtClean="0"/>
+                        <a:t>chest_pain</a:t>
+                      </a:r>
+                      <a:r>
+                        <a:rPr lang="en-US" altLang="zh-TW" dirty="0" smtClean="0"/>
+                        <a:t> + thalium_scan_1 + thalium_scan_3</a:t>
+                      </a:r>
+                    </a:p>
+                    <a:p>
+                      <a:pPr marL="0" marR="0" indent="0" algn="ctr" defTabSz="914400" rtl="0" eaLnBrk="1" fontAlgn="auto" latinLnBrk="0" hangingPunct="1">
+                        <a:lnSpc>
+                          <a:spcPct val="100000"/>
+                        </a:lnSpc>
+                        <a:spcBef>
+                          <a:spcPts val="0"/>
+                        </a:spcBef>
+                        <a:spcAft>
+                          <a:spcPts val="0"/>
+                        </a:spcAft>
+                        <a:buClrTx/>
+                        <a:buSzTx/>
+                        <a:buFontTx/>
+                        <a:buNone/>
+                        <a:tabLst/>
+                        <a:defRPr/>
+                      </a:pPr>
+                      <a:r>
+                        <a:rPr lang="en-US" altLang="zh-TW" dirty="0" smtClean="0"/>
+                        <a:t>(column: </a:t>
+                      </a:r>
+                      <a:r>
+                        <a:rPr lang="en-US" altLang="zh-TW" dirty="0" err="1" smtClean="0"/>
+                        <a:t>thalium_scan</a:t>
+                      </a:r>
+                      <a:r>
+                        <a:rPr lang="en-US" altLang="zh-TW" dirty="0" smtClean="0"/>
+                        <a:t>)</a:t>
+                      </a:r>
+                      <a:endParaRPr lang="zh-TW" altLang="en-US" dirty="0"/>
+                    </a:p>
+                  </a:txBody>
+                  <a:tcPr/>
+                </a:tc>
+                <a:tc>
+                  <a:txBody>
+                    <a:bodyPr/>
+                    <a:lstStyle/>
+                    <a:p>
+                      <a:pPr algn="ctr"/>
+                      <a:r>
+                        <a:rPr lang="en-US" altLang="zh-TW" dirty="0" smtClean="0"/>
+                        <a:t>0.86792</a:t>
+                      </a:r>
+                      <a:endParaRPr lang="zh-TW" altLang="en-US" dirty="0"/>
+                    </a:p>
+                  </a:txBody>
+                  <a:tcPr/>
+                </a:tc>
+                <a:tc>
+                  <a:txBody>
+                    <a:bodyPr/>
+                    <a:lstStyle/>
+                    <a:p>
+                      <a:pPr algn="ctr"/>
+                      <a:r>
+                        <a:rPr lang="en-US" altLang="zh-TW" dirty="0" smtClean="0"/>
+                        <a:t>0.90909</a:t>
+                      </a:r>
+                      <a:endParaRPr lang="zh-TW" altLang="en-US" dirty="0"/>
+                    </a:p>
+                  </a:txBody>
+                  <a:tcPr/>
+                </a:tc>
+                <a:extLst>
+                  <a:ext uri="{0D108BD9-81ED-4DB2-BD59-A6C34878D82A}">
+                    <a16:rowId xmlns:a16="http://schemas.microsoft.com/office/drawing/2014/main" val="1583841695"/>
+                  </a:ext>
+                </a:extLst>
+              </a:tr>
+              <a:tr h="794589">
+                <a:tc>
+                  <a:txBody>
+                    <a:bodyPr/>
+                    <a:lstStyle/>
+                    <a:p>
+                      <a:pPr algn="ctr"/>
+                      <a:r>
+                        <a:rPr lang="en-US" altLang="zh-TW" dirty="0" err="1" smtClean="0"/>
+                        <a:t>resting_bp_without_label</a:t>
+                      </a:r>
+                      <a:r>
+                        <a:rPr lang="en-US" altLang="zh-TW" dirty="0" smtClean="0"/>
+                        <a:t> + </a:t>
+                      </a:r>
+                      <a:r>
+                        <a:rPr lang="en-US" altLang="zh-TW" dirty="0" err="1" smtClean="0"/>
+                        <a:t>slope_label</a:t>
+                      </a:r>
+                      <a:r>
+                        <a:rPr lang="en-US" altLang="zh-TW" dirty="0" smtClean="0"/>
+                        <a:t> +</a:t>
+                      </a:r>
+                      <a:r>
+                        <a:rPr lang="en-US" altLang="zh-TW" baseline="0" dirty="0" smtClean="0"/>
+                        <a:t> </a:t>
+                      </a:r>
+                      <a:r>
+                        <a:rPr lang="en-US" altLang="zh-TW" dirty="0" smtClean="0"/>
+                        <a:t>vessels </a:t>
+                      </a:r>
+                      <a:r>
+                        <a:rPr lang="en-US" altLang="zh-TW" dirty="0" smtClean="0"/>
+                        <a:t> + chest_pain_2 + chest_pain_3 + chest_pain_4 + </a:t>
+                      </a:r>
+                      <a:r>
+                        <a:rPr lang="en-US" altLang="zh-TW" dirty="0" err="1" smtClean="0"/>
+                        <a:t>thalium_scan</a:t>
+                      </a:r>
+                      <a:endParaRPr lang="en-US" altLang="zh-TW" dirty="0" smtClean="0"/>
+                    </a:p>
+                    <a:p>
+                      <a:pPr marL="0" marR="0" indent="0" algn="ctr" defTabSz="914400" rtl="0" eaLnBrk="1" fontAlgn="auto" latinLnBrk="0" hangingPunct="1">
+                        <a:lnSpc>
+                          <a:spcPct val="100000"/>
+                        </a:lnSpc>
+                        <a:spcBef>
+                          <a:spcPts val="0"/>
+                        </a:spcBef>
+                        <a:spcAft>
+                          <a:spcPts val="0"/>
+                        </a:spcAft>
+                        <a:buClrTx/>
+                        <a:buSzTx/>
+                        <a:buFontTx/>
+                        <a:buNone/>
+                        <a:tabLst/>
+                        <a:defRPr/>
+                      </a:pPr>
+                      <a:r>
+                        <a:rPr lang="en-US" altLang="zh-TW" dirty="0" smtClean="0"/>
+                        <a:t>(column: </a:t>
+                      </a:r>
+                      <a:r>
+                        <a:rPr lang="en-US" altLang="zh-TW" dirty="0" err="1" smtClean="0"/>
+                        <a:t>chest_pain</a:t>
+                      </a:r>
+                      <a:r>
+                        <a:rPr lang="en-US" altLang="zh-TW" dirty="0" smtClean="0"/>
+                        <a:t>)</a:t>
+                      </a:r>
+                      <a:endParaRPr lang="zh-TW" altLang="en-US" dirty="0" smtClean="0"/>
+                    </a:p>
+                  </a:txBody>
+                  <a:tcPr/>
+                </a:tc>
+                <a:tc>
+                  <a:txBody>
+                    <a:bodyPr/>
+                    <a:lstStyle/>
+                    <a:p>
+                      <a:pPr algn="ctr"/>
+                      <a:r>
+                        <a:rPr lang="en-US" altLang="zh-TW" dirty="0" smtClean="0"/>
+                        <a:t>0.77358</a:t>
+                      </a:r>
+                      <a:endParaRPr lang="zh-TW" altLang="en-US" dirty="0"/>
+                    </a:p>
+                  </a:txBody>
+                  <a:tcPr/>
+                </a:tc>
+                <a:tc>
+                  <a:txBody>
+                    <a:bodyPr/>
+                    <a:lstStyle/>
+                    <a:p>
+                      <a:pPr algn="ctr"/>
+                      <a:r>
+                        <a:rPr lang="en-US" altLang="zh-TW" dirty="0" smtClean="0"/>
+                        <a:t>0.86363</a:t>
+                      </a:r>
+                      <a:endParaRPr lang="zh-TW" altLang="en-US" dirty="0"/>
+                    </a:p>
+                  </a:txBody>
+                  <a:tcPr/>
+                </a:tc>
+                <a:extLst>
+                  <a:ext uri="{0D108BD9-81ED-4DB2-BD59-A6C34878D82A}">
+                    <a16:rowId xmlns:a16="http://schemas.microsoft.com/office/drawing/2014/main" val="128147466"/>
+                  </a:ext>
+                </a:extLst>
+              </a:tr>
+            </a:tbl>
+          </a:graphicData>
+        </a:graphic>
+      </p:graphicFrame>
+    </p:spTree>
+    <p:extLst>
+      <p:ext uri="{BB962C8B-B14F-4D97-AF65-F5344CB8AC3E}">
+        <p14:creationId xmlns:p14="http://schemas.microsoft.com/office/powerpoint/2010/main" val="1109661518"/>
+      </p:ext>
+    </p:extLst>
+  </p:cSld>
+  <p:clrMapOvr>
+    <a:masterClrMapping/>
+  </p:clrMapOvr>
+</p:sld>
+</file>
+
+<file path=ppt/slides/slide13.xml><?xml version="1.0" encoding="utf-8"?>
 <p:sld xmlns:a="http://schemas.openxmlformats.org/drawingml/2006/main" xmlns:r="http://schemas.openxmlformats.org/officeDocument/2006/relationships" xmlns:p="http://schemas.openxmlformats.org/presentationml/2006/main">
   <p:cSld>
     <p:spTree>
@@ -4767,7 +5179,7 @@
 </p:sld>
 </file>
 
-<file path=ppt/slides/slide13.xml><?xml version="1.0" encoding="utf-8"?>
+<file path=ppt/slides/slide14.xml><?xml version="1.0" encoding="utf-8"?>
 <p:sld xmlns:a="http://schemas.openxmlformats.org/drawingml/2006/main" xmlns:r="http://schemas.openxmlformats.org/officeDocument/2006/relationships" xmlns:p="http://schemas.openxmlformats.org/presentationml/2006/main">
   <p:cSld>
     <p:spTree>
@@ -5242,182 +5654,6 @@
 </p:sld>
 </file>
 
-<file path=ppt/slides/slide14.xml><?xml version="1.0" encoding="utf-8"?>
-<p:sld xmlns:a="http://schemas.openxmlformats.org/drawingml/2006/main" xmlns:r="http://schemas.openxmlformats.org/officeDocument/2006/relationships" xmlns:p="http://schemas.openxmlformats.org/presentationml/2006/main">
-  <p:cSld>
-    <p:spTree>
-      <p:nvGrpSpPr>
-        <p:cNvPr id="1" name=""/>
-        <p:cNvGrpSpPr/>
-        <p:nvPr/>
-      </p:nvGrpSpPr>
-      <p:grpSpPr>
-        <a:xfrm>
-          <a:off x="0" y="0"/>
-          <a:ext cx="0" cy="0"/>
-          <a:chOff x="0" y="0"/>
-          <a:chExt cx="0" cy="0"/>
-        </a:xfrm>
-      </p:grpSpPr>
-      <p:sp>
-        <p:nvSpPr>
-          <p:cNvPr id="3" name="Content Placeholder 2">
-            <a:extLst>
-              <a:ext uri="{FF2B5EF4-FFF2-40B4-BE49-F238E27FC236}">
-                <a16:creationId xmlns:a16="http://schemas.microsoft.com/office/drawing/2014/main" id="{97F7C985-F283-3F42-A334-D18BFB328D95}"/>
-              </a:ext>
-            </a:extLst>
-          </p:cNvPr>
-          <p:cNvSpPr>
-            <a:spLocks noGrp="1"/>
-          </p:cNvSpPr>
-          <p:nvPr>
-            <p:ph idx="1"/>
-          </p:nvPr>
-        </p:nvSpPr>
-        <p:spPr/>
-        <p:txBody>
-          <a:bodyPr/>
-          <a:lstStyle/>
-          <a:p>
-            <a:pPr lvl="3"/>
-            <a:r>
-              <a:rPr lang="en-US" altLang="zh-TW" sz="1800" dirty="0" err="1" smtClean="0"/>
-              <a:t>thalium_scan</a:t>
-            </a:r>
-            <a:endParaRPr lang="en-US" altLang="zh-TW" sz="1800" dirty="0" smtClean="0"/>
-          </a:p>
-          <a:p>
-            <a:pPr lvl="4"/>
-            <a:r>
-              <a:rPr lang="en-US" altLang="zh-TW" sz="1400" dirty="0" smtClean="0"/>
-              <a:t>Origin:  3,6,7 =&gt; transform to 1,2,3</a:t>
-            </a:r>
-          </a:p>
-          <a:p>
-            <a:pPr lvl="4"/>
-            <a:r>
-              <a:rPr lang="en-US" altLang="zh-TW" sz="1400" dirty="0" smtClean="0"/>
-              <a:t>One – hot encoding</a:t>
-            </a:r>
-          </a:p>
-          <a:p>
-            <a:pPr lvl="5"/>
-            <a:r>
-              <a:rPr lang="en-US" altLang="zh-TW" sz="1400" dirty="0" smtClean="0"/>
-              <a:t>Important Concept</a:t>
-            </a:r>
-          </a:p>
-          <a:p>
-            <a:pPr lvl="5"/>
-            <a:r>
-              <a:rPr lang="en-US" altLang="zh-TW" sz="1400" dirty="0" smtClean="0"/>
-              <a:t>Since there are three categories, but we actually only need two categories to  represent</a:t>
-            </a:r>
-          </a:p>
-          <a:p>
-            <a:pPr lvl="5"/>
-            <a:r>
-              <a:rPr lang="en-US" altLang="zh-TW" sz="1400" dirty="0" smtClean="0"/>
-              <a:t>So, we use </a:t>
-            </a:r>
-            <a:r>
-              <a:rPr lang="en-US" altLang="zh-TW" sz="1400" dirty="0"/>
-              <a:t>thalium_scan_1 + </a:t>
-            </a:r>
-            <a:r>
-              <a:rPr lang="en-US" altLang="zh-TW" sz="1400" dirty="0" smtClean="0"/>
-              <a:t>thalium_scan_3 as feature </a:t>
-            </a:r>
-          </a:p>
-          <a:p>
-            <a:pPr lvl="5"/>
-            <a:endParaRPr lang="en-US" altLang="zh-TW" sz="1400" dirty="0"/>
-          </a:p>
-        </p:txBody>
-      </p:sp>
-      <p:sp>
-        <p:nvSpPr>
-          <p:cNvPr id="7" name="Title 1">
-            <a:extLst>
-              <a:ext uri="{FF2B5EF4-FFF2-40B4-BE49-F238E27FC236}">
-                <a16:creationId xmlns:a16="http://schemas.microsoft.com/office/drawing/2014/main" id="{00ADFE7D-9DD7-4F4B-A3EE-AC01CF7FBC49}"/>
-              </a:ext>
-            </a:extLst>
-          </p:cNvPr>
-          <p:cNvSpPr>
-            <a:spLocks noGrp="1"/>
-          </p:cNvSpPr>
-          <p:nvPr>
-            <p:ph type="title"/>
-          </p:nvPr>
-        </p:nvSpPr>
-        <p:spPr>
-          <a:xfrm>
-            <a:off x="1451579" y="804519"/>
-            <a:ext cx="9603275" cy="1049235"/>
-          </a:xfrm>
-        </p:spPr>
-        <p:txBody>
-          <a:bodyPr>
-            <a:normAutofit/>
-          </a:bodyPr>
-          <a:lstStyle/>
-          <a:p>
-            <a:r>
-              <a:rPr lang="zh-CN" altLang="en-US" b="1" dirty="0"/>
-              <a:t>實驗方法</a:t>
-            </a:r>
-            <a:r>
-              <a:rPr lang="en-US" altLang="zh-CN" b="1" dirty="0"/>
-              <a:t/>
-            </a:r>
-            <a:br>
-              <a:rPr lang="en-US" altLang="zh-CN" b="1" dirty="0"/>
-            </a:br>
-            <a:r>
-              <a:rPr lang="en-US" altLang="zh-CN" sz="1300" b="1" dirty="0"/>
-              <a:t/>
-            </a:r>
-            <a:br>
-              <a:rPr lang="en-US" altLang="zh-CN" sz="1300" b="1" dirty="0"/>
-            </a:br>
-            <a:r>
-              <a:rPr lang="zh-CN" altLang="en-US" sz="2000" b="1" dirty="0" smtClean="0"/>
-              <a:t>模型</a:t>
-            </a:r>
-            <a:r>
-              <a:rPr lang="zh-TW" altLang="en-US" sz="2000" b="1" dirty="0" smtClean="0"/>
-              <a:t> </a:t>
-            </a:r>
-            <a:r>
-              <a:rPr lang="en-US" altLang="zh-TW" sz="2000" b="1" dirty="0" smtClean="0"/>
-              <a:t>– logistic regression (FINAL</a:t>
-            </a:r>
-            <a:endParaRPr lang="en-US" altLang="zh-CN" sz="2000" b="1" dirty="0"/>
-          </a:p>
-        </p:txBody>
-      </p:sp>
-    </p:spTree>
-    <p:extLst>
-      <p:ext uri="{BB962C8B-B14F-4D97-AF65-F5344CB8AC3E}">
-        <p14:creationId xmlns:p14="http://schemas.microsoft.com/office/powerpoint/2010/main" val="4255426266"/>
-      </p:ext>
-    </p:extLst>
-  </p:cSld>
-  <p:clrMapOvr>
-    <a:masterClrMapping/>
-  </p:clrMapOvr>
-  <p:timing>
-    <p:tnLst>
-      <p:par>
-        <p:cTn id="1" dur="indefinite" restart="never" nodeType="tmRoot"/>
-      </p:par>
-    </p:tnLst>
-  </p:timing>
-</p:sld>
-</file>
-
 <file path=ppt/slides/slide15.xml><?xml version="1.0" encoding="utf-8"?>
 <p:sld xmlns:a="http://schemas.openxmlformats.org/drawingml/2006/main" xmlns:r="http://schemas.openxmlformats.org/officeDocument/2006/relationships" xmlns:p="http://schemas.openxmlformats.org/presentationml/2006/main">
   <p:cSld>
@@ -5437,6 +5673,83 @@
       </p:grpSpPr>
       <p:sp>
         <p:nvSpPr>
+          <p:cNvPr id="3" name="Content Placeholder 2">
+            <a:extLst>
+              <a:ext uri="{FF2B5EF4-FFF2-40B4-BE49-F238E27FC236}">
+                <a16:creationId xmlns:a16="http://schemas.microsoft.com/office/drawing/2014/main" id="{97F7C985-F283-3F42-A334-D18BFB328D95}"/>
+              </a:ext>
+            </a:extLst>
+          </p:cNvPr>
+          <p:cNvSpPr>
+            <a:spLocks noGrp="1"/>
+          </p:cNvSpPr>
+          <p:nvPr>
+            <p:ph idx="1"/>
+          </p:nvPr>
+        </p:nvSpPr>
+        <p:spPr/>
+        <p:txBody>
+          <a:bodyPr/>
+          <a:lstStyle/>
+          <a:p>
+            <a:pPr lvl="3"/>
+            <a:r>
+              <a:rPr lang="en-US" altLang="zh-TW" sz="1800" dirty="0" err="1" smtClean="0"/>
+              <a:t>thalium_scan</a:t>
+            </a:r>
+            <a:endParaRPr lang="en-US" altLang="zh-TW" sz="1800" dirty="0" smtClean="0"/>
+          </a:p>
+          <a:p>
+            <a:pPr lvl="4"/>
+            <a:r>
+              <a:rPr lang="en-US" altLang="zh-TW" sz="1400" dirty="0" smtClean="0"/>
+              <a:t>Origin:  3,6,7 =&gt; transform to 1,2,3</a:t>
+            </a:r>
+          </a:p>
+          <a:p>
+            <a:pPr lvl="4"/>
+            <a:r>
+              <a:rPr lang="en-US" altLang="zh-TW" sz="1400" dirty="0" smtClean="0"/>
+              <a:t>One – hot encoding</a:t>
+            </a:r>
+          </a:p>
+          <a:p>
+            <a:pPr lvl="5"/>
+            <a:r>
+              <a:rPr lang="en-US" altLang="zh-TW" sz="1400" dirty="0" smtClean="0"/>
+              <a:t>Important Concept</a:t>
+            </a:r>
+          </a:p>
+          <a:p>
+            <a:pPr lvl="5"/>
+            <a:r>
+              <a:rPr lang="en-US" altLang="zh-TW" sz="1400" dirty="0" smtClean="0"/>
+              <a:t>Since there are three categories, but we actually only need two categories to  represent</a:t>
+            </a:r>
+          </a:p>
+          <a:p>
+            <a:pPr lvl="5"/>
+            <a:r>
+              <a:rPr lang="en-US" altLang="zh-TW" sz="1400" dirty="0" smtClean="0"/>
+              <a:t>So, we use </a:t>
+            </a:r>
+            <a:r>
+              <a:rPr lang="en-US" altLang="zh-TW" sz="1400" dirty="0"/>
+              <a:t>thalium_scan_1 + </a:t>
+            </a:r>
+            <a:r>
+              <a:rPr lang="en-US" altLang="zh-TW" sz="1400" dirty="0" smtClean="0"/>
+              <a:t>thalium_scan_3 as feature </a:t>
+            </a:r>
+          </a:p>
+          <a:p>
+            <a:pPr lvl="5"/>
+            <a:endParaRPr lang="en-US" altLang="zh-TW" sz="1400" dirty="0"/>
+          </a:p>
+        </p:txBody>
+      </p:sp>
+      <p:sp>
+        <p:nvSpPr>
           <p:cNvPr id="7" name="Title 1">
             <a:extLst>
               <a:ext uri="{FF2B5EF4-FFF2-40B4-BE49-F238E27FC236}">
@@ -5451,7 +5764,12 @@
             <p:ph type="title"/>
           </p:nvPr>
         </p:nvSpPr>
-        <p:spPr/>
+        <p:spPr>
+          <a:xfrm>
+            <a:off x="1451579" y="804519"/>
+            <a:ext cx="9603275" cy="1049235"/>
+          </a:xfrm>
+        </p:spPr>
         <p:txBody>
           <a:bodyPr>
             <a:normAutofit/>
@@ -5492,99 +5810,10 @@
           </a:p>
         </p:txBody>
       </p:sp>
-      <p:sp>
-        <p:nvSpPr>
-          <p:cNvPr id="4" name="內容版面配置區 3"/>
-          <p:cNvSpPr>
-            <a:spLocks noGrp="1"/>
-          </p:cNvSpPr>
-          <p:nvPr>
-            <p:ph idx="1"/>
-          </p:nvPr>
-        </p:nvSpPr>
-        <p:spPr/>
-        <p:txBody>
-          <a:bodyPr>
-            <a:normAutofit fontScale="92500" lnSpcReduction="20000"/>
-          </a:bodyPr>
-          <a:lstStyle/>
-          <a:p>
-            <a:r>
-              <a:rPr lang="en-US" altLang="zh-TW" dirty="0"/>
-              <a:t>c</a:t>
-            </a:r>
-            <a:r>
-              <a:rPr lang="en-US" altLang="zh-TW" dirty="0" smtClean="0"/>
-              <a:t>hoose model by 5- fold cross validation and evaluated by accuracy</a:t>
-            </a:r>
-          </a:p>
-          <a:p>
-            <a:r>
-              <a:rPr lang="en-US" altLang="zh-TW" dirty="0" smtClean="0"/>
-              <a:t>Public score: 0.90909</a:t>
-            </a:r>
-          </a:p>
-          <a:p>
-            <a:r>
-              <a:rPr lang="en-US" altLang="zh-TW" dirty="0" smtClean="0"/>
-              <a:t>Private score: 0.86792</a:t>
-            </a:r>
-          </a:p>
-          <a:p>
-            <a:pPr marL="0" indent="0">
-              <a:buNone/>
-            </a:pPr>
-            <a:endParaRPr lang="en-US" altLang="zh-TW" dirty="0" smtClean="0"/>
-          </a:p>
-          <a:p>
-            <a:endParaRPr lang="en-US" altLang="zh-TW" dirty="0"/>
-          </a:p>
-          <a:p>
-            <a:endParaRPr lang="en-US" altLang="zh-TW" dirty="0" smtClean="0"/>
-          </a:p>
-          <a:p>
-            <a:endParaRPr lang="en-US" altLang="zh-TW" dirty="0"/>
-          </a:p>
-          <a:p>
-            <a:r>
-              <a:rPr lang="en-US" altLang="zh-TW" dirty="0"/>
-              <a:t>o</a:t>
-            </a:r>
-            <a:r>
-              <a:rPr lang="en-US" altLang="zh-TW" dirty="0" smtClean="0"/>
-              <a:t>ther parameters: seed(4)</a:t>
-            </a:r>
-          </a:p>
-        </p:txBody>
-      </p:sp>
-      <p:pic>
-        <p:nvPicPr>
-          <p:cNvPr id="6" name="內容版面配置區 1"/>
-          <p:cNvPicPr>
-            <a:picLocks noChangeAspect="1"/>
-          </p:cNvPicPr>
-          <p:nvPr/>
-        </p:nvPicPr>
-        <p:blipFill>
-          <a:blip r:embed="rId2"/>
-          <a:stretch>
-            <a:fillRect/>
-          </a:stretch>
-        </p:blipFill>
-        <p:spPr>
-          <a:xfrm>
-            <a:off x="1451579" y="3741038"/>
-            <a:ext cx="9604375" cy="923832"/>
-          </a:xfrm>
-          <a:prstGeom prst="rect">
-            <a:avLst/>
-          </a:prstGeom>
-        </p:spPr>
-      </p:pic>
     </p:spTree>
     <p:extLst>
       <p:ext uri="{BB962C8B-B14F-4D97-AF65-F5344CB8AC3E}">
-        <p14:creationId xmlns:p14="http://schemas.microsoft.com/office/powerpoint/2010/main" val="815591550"/>
+        <p14:creationId xmlns:p14="http://schemas.microsoft.com/office/powerpoint/2010/main" val="4255426266"/>
       </p:ext>
     </p:extLst>
   </p:cSld>
@@ -5688,89 +5917,88 @@
         <p:spPr/>
         <p:txBody>
           <a:bodyPr>
-            <a:normAutofit lnSpcReduction="10000"/>
+            <a:normAutofit/>
           </a:bodyPr>
           <a:lstStyle/>
           <a:p>
             <a:r>
               <a:rPr lang="en-US" altLang="zh-TW" dirty="0" smtClean="0"/>
-              <a:t>Other interesting results:</a:t>
+              <a:t>Result:</a:t>
             </a:r>
           </a:p>
           <a:p>
             <a:pPr lvl="1"/>
             <a:r>
               <a:rPr lang="en-US" altLang="zh-TW" dirty="0" smtClean="0"/>
-              <a:t>         Private      Public </a:t>
-            </a:r>
-            <a:endParaRPr lang="en-US" altLang="zh-TW" dirty="0"/>
+              <a:t>Public </a:t>
+            </a:r>
+            <a:r>
+              <a:rPr lang="en-US" altLang="zh-TW" dirty="0" smtClean="0"/>
+              <a:t>score: 0.90909</a:t>
+            </a:r>
           </a:p>
           <a:p>
             <a:pPr lvl="1"/>
             <a:r>
               <a:rPr lang="en-US" altLang="zh-TW" dirty="0" smtClean="0"/>
-              <a:t>5:     0.86792     0.90909</a:t>
-            </a:r>
-          </a:p>
-          <a:p>
-            <a:pPr lvl="1"/>
-            <a:r>
-              <a:rPr lang="en-US" altLang="zh-TW" dirty="0" smtClean="0"/>
-              <a:t>6:      0.84905     0.81818</a:t>
-            </a:r>
-          </a:p>
-          <a:p>
-            <a:pPr lvl="1"/>
-            <a:r>
-              <a:rPr lang="en-US" altLang="zh-TW" dirty="0" smtClean="0"/>
-              <a:t>7:      0.83018     0.77272</a:t>
-            </a:r>
-          </a:p>
-          <a:p>
-            <a:pPr lvl="1"/>
-            <a:r>
-              <a:rPr lang="en-US" altLang="zh-TW" dirty="0" smtClean="0"/>
-              <a:t>8:</a:t>
-            </a:r>
-          </a:p>
-          <a:p>
-            <a:pPr lvl="1"/>
-            <a:r>
-              <a:rPr lang="en-US" altLang="zh-TW" dirty="0" smtClean="0"/>
-              <a:t>9:</a:t>
-            </a:r>
-          </a:p>
-          <a:p>
-            <a:pPr lvl="1"/>
-            <a:r>
-              <a:rPr lang="en-US" altLang="zh-TW" dirty="0" smtClean="0"/>
-              <a:t>10 …..</a:t>
-            </a:r>
-          </a:p>
-          <a:p>
-            <a:pPr lvl="1"/>
-            <a:r>
-              <a:rPr lang="en-US" altLang="zh-TW" dirty="0" smtClean="0"/>
-              <a:t>(</a:t>
-            </a:r>
-            <a:r>
-              <a:rPr lang="zh-TW" altLang="en-US" dirty="0" smtClean="0"/>
-              <a:t>麻煩圖片</a:t>
-            </a:r>
-            <a:endParaRPr lang="en-US" altLang="zh-TW" dirty="0" smtClean="0"/>
-          </a:p>
-          <a:p>
-            <a:pPr marL="457200" lvl="1" indent="0">
+              <a:t>Private score: 0.86792</a:t>
+            </a:r>
+          </a:p>
+          <a:p>
+            <a:pPr marL="0" indent="0">
               <a:buNone/>
             </a:pPr>
             <a:endParaRPr lang="en-US" altLang="zh-TW" dirty="0" smtClean="0"/>
           </a:p>
-        </p:txBody>
-      </p:sp>
+          <a:p>
+            <a:pPr marL="0" indent="0">
+              <a:buNone/>
+            </a:pPr>
+            <a:endParaRPr lang="en-US" altLang="zh-TW" dirty="0"/>
+          </a:p>
+          <a:p>
+            <a:endParaRPr lang="en-US" altLang="zh-TW" dirty="0" smtClean="0"/>
+          </a:p>
+          <a:p>
+            <a:r>
+              <a:rPr lang="en-US" altLang="zh-TW" dirty="0" smtClean="0"/>
+              <a:t>other </a:t>
+            </a:r>
+            <a:r>
+              <a:rPr lang="en-US" altLang="zh-TW" dirty="0" smtClean="0"/>
+              <a:t>parameters: seed(4)</a:t>
+            </a:r>
+          </a:p>
+        </p:txBody>
+      </p:sp>
+      <p:pic>
+        <p:nvPicPr>
+          <p:cNvPr id="6" name="內容版面配置區 1"/>
+          <p:cNvPicPr>
+            <a:picLocks noChangeAspect="1"/>
+          </p:cNvPicPr>
+          <p:nvPr/>
+        </p:nvPicPr>
+        <p:blipFill>
+          <a:blip r:embed="rId2"/>
+          <a:stretch>
+            <a:fillRect/>
+          </a:stretch>
+        </p:blipFill>
+        <p:spPr>
+          <a:xfrm>
+            <a:off x="1451579" y="3516920"/>
+            <a:ext cx="9604375" cy="923832"/>
+          </a:xfrm>
+          <a:prstGeom prst="rect">
+            <a:avLst/>
+          </a:prstGeom>
+        </p:spPr>
+      </p:pic>
     </p:spTree>
     <p:extLst>
       <p:ext uri="{BB962C8B-B14F-4D97-AF65-F5344CB8AC3E}">
-        <p14:creationId xmlns:p14="http://schemas.microsoft.com/office/powerpoint/2010/main" val="2011558927"/>
+        <p14:creationId xmlns:p14="http://schemas.microsoft.com/office/powerpoint/2010/main" val="815591550"/>
       </p:ext>
     </p:extLst>
   </p:cSld>
@@ -5806,7 +6034,13 @@
       </p:grpSpPr>
       <p:sp>
         <p:nvSpPr>
-          <p:cNvPr id="2" name="標題 1"/>
+          <p:cNvPr id="7" name="Title 1">
+            <a:extLst>
+              <a:ext uri="{FF2B5EF4-FFF2-40B4-BE49-F238E27FC236}">
+                <a16:creationId xmlns:a16="http://schemas.microsoft.com/office/drawing/2014/main" id="{00ADFE7D-9DD7-4F4B-A3EE-AC01CF7FBC49}"/>
+              </a:ext>
+            </a:extLst>
+          </p:cNvPr>
           <p:cNvSpPr>
             <a:spLocks noGrp="1"/>
           </p:cNvSpPr>
@@ -5816,78 +6050,48 @@
         </p:nvSpPr>
         <p:spPr/>
         <p:txBody>
-          <a:bodyPr/>
-          <a:lstStyle/>
-          <a:p>
-            <a:r>
-              <a:rPr lang="zh-CN" altLang="en-US" b="1" dirty="0">
-                <a:solidFill>
-                  <a:prstClr val="black"/>
-                </a:solidFill>
-              </a:rPr>
+          <a:bodyPr>
+            <a:normAutofit/>
+          </a:bodyPr>
+          <a:lstStyle/>
+          <a:p>
+            <a:r>
+              <a:rPr lang="zh-CN" altLang="en-US" b="1" dirty="0"/>
               <a:t>實驗方法</a:t>
             </a:r>
             <a:r>
-              <a:rPr lang="en-US" altLang="zh-CN" b="1" dirty="0">
-                <a:solidFill>
-                  <a:prstClr val="black"/>
-                </a:solidFill>
-              </a:rPr>
+              <a:rPr lang="en-US" altLang="zh-CN" b="1" dirty="0"/>
               <a:t/>
             </a:r>
             <a:br>
-              <a:rPr lang="en-US" altLang="zh-CN" b="1" dirty="0">
-                <a:solidFill>
-                  <a:prstClr val="black"/>
-                </a:solidFill>
-              </a:rPr>
+              <a:rPr lang="en-US" altLang="zh-CN" b="1" dirty="0"/>
             </a:br>
             <a:r>
-              <a:rPr lang="en-US" altLang="zh-CN" sz="1300" b="1" dirty="0">
-                <a:solidFill>
-                  <a:prstClr val="black"/>
-                </a:solidFill>
-              </a:rPr>
+              <a:rPr lang="en-US" altLang="zh-CN" sz="1300" b="1" dirty="0"/>
               <a:t/>
             </a:r>
             <a:br>
-              <a:rPr lang="en-US" altLang="zh-CN" sz="1300" b="1" dirty="0">
-                <a:solidFill>
-                  <a:prstClr val="black"/>
-                </a:solidFill>
-              </a:rPr>
+              <a:rPr lang="en-US" altLang="zh-CN" sz="1300" b="1" dirty="0"/>
             </a:br>
             <a:r>
-              <a:rPr lang="zh-CN" altLang="en-US" sz="2000" b="1" dirty="0">
-                <a:solidFill>
-                  <a:prstClr val="black"/>
-                </a:solidFill>
-              </a:rPr>
+              <a:rPr lang="zh-CN" altLang="en-US" sz="2000" b="1" dirty="0" smtClean="0"/>
               <a:t>模型</a:t>
             </a:r>
             <a:r>
-              <a:rPr lang="zh-TW" altLang="en-US" sz="2000" b="1" dirty="0">
-                <a:solidFill>
-                  <a:prstClr val="black"/>
-                </a:solidFill>
-              </a:rPr>
+              <a:rPr lang="zh-TW" altLang="en-US" sz="2000" b="1" dirty="0" smtClean="0"/>
               <a:t> </a:t>
             </a:r>
             <a:r>
-              <a:rPr lang="en-US" altLang="zh-TW" sz="2000" b="1" dirty="0">
-                <a:solidFill>
-                  <a:prstClr val="black"/>
-                </a:solidFill>
-              </a:rPr>
+              <a:rPr lang="en-US" altLang="zh-TW" sz="2000" b="1" dirty="0" smtClean="0"/>
               <a:t>– logistic regression (FINAL</a:t>
             </a:r>
-            <a:endParaRPr lang="zh-TW" altLang="en-US" dirty="0"/>
-          </a:p>
-        </p:txBody>
-      </p:sp>
-      <p:sp>
-        <p:nvSpPr>
-          <p:cNvPr id="3" name="內容版面配置區 2"/>
+            <a:endParaRPr lang="en-US" altLang="zh-CN" sz="2000" b="1" dirty="0"/>
+          </a:p>
+        </p:txBody>
+      </p:sp>
+      <p:sp>
+        <p:nvSpPr>
+          <p:cNvPr id="4" name="內容版面配置區 3"/>
           <p:cNvSpPr>
             <a:spLocks noGrp="1"/>
           </p:cNvSpPr>
@@ -5898,49 +6102,32 @@
         <p:spPr/>
         <p:txBody>
           <a:bodyPr>
-            <a:normAutofit fontScale="92500" lnSpcReduction="10000"/>
+            <a:normAutofit/>
           </a:bodyPr>
           <a:lstStyle/>
           <a:p>
             <a:r>
               <a:rPr lang="en-US" altLang="zh-TW" dirty="0" smtClean="0"/>
-              <a:t>Other tries:</a:t>
-            </a:r>
-          </a:p>
-          <a:p>
-            <a:pPr lvl="1"/>
-            <a:r>
-              <a:rPr lang="en-US" altLang="zh-TW" dirty="0" smtClean="0"/>
-              <a:t>Change the seed used to shuffle the data order</a:t>
-            </a:r>
-          </a:p>
-          <a:p>
-            <a:endParaRPr lang="en-US" altLang="zh-TW" dirty="0"/>
-          </a:p>
-          <a:p>
+              <a:t>Other interesting results:</a:t>
+            </a:r>
+          </a:p>
+          <a:p>
+            <a:pPr marL="457200" lvl="1" indent="0">
+              <a:buNone/>
+            </a:pPr>
             <a:endParaRPr lang="en-US" altLang="zh-TW" dirty="0" smtClean="0"/>
-          </a:p>
-          <a:p>
-            <a:endParaRPr lang="en-US" altLang="zh-TW" dirty="0"/>
-          </a:p>
-          <a:p>
-            <a:endParaRPr lang="en-US" altLang="zh-TW" dirty="0" smtClean="0"/>
-          </a:p>
-          <a:p>
-            <a:endParaRPr lang="en-US" altLang="zh-TW" dirty="0"/>
-          </a:p>
-          <a:p>
-            <a:r>
-              <a:rPr lang="en-US" altLang="zh-TW" dirty="0" smtClean="0"/>
-              <a:t>The way we cut into fold is important, it can be improved</a:t>
-            </a:r>
-            <a:endParaRPr lang="zh-TW" altLang="en-US" dirty="0"/>
           </a:p>
         </p:txBody>
       </p:sp>
       <p:pic>
         <p:nvPicPr>
-          <p:cNvPr id="4" name="圖片 3"/>
+          <p:cNvPr id="5" name="內容版面配置區 3">
+            <a:extLst>
+              <a:ext uri="{FF2B5EF4-FFF2-40B4-BE49-F238E27FC236}">
+                <a16:creationId xmlns:a16="http://schemas.microsoft.com/office/drawing/2014/main" id="{57B3E7EB-3AE8-4544-8F14-C62DD513A63C}"/>
+              </a:ext>
+            </a:extLst>
+          </p:cNvPr>
           <p:cNvPicPr>
             <a:picLocks noChangeAspect="1"/>
           </p:cNvPicPr>
@@ -5954,8 +6141,8 @@
         </p:blipFill>
         <p:spPr>
           <a:xfrm>
-            <a:off x="4062141" y="3024702"/>
-            <a:ext cx="6532739" cy="1432672"/>
+            <a:off x="7494494" y="2380310"/>
+            <a:ext cx="3638499" cy="3638499"/>
           </a:xfrm>
           <a:prstGeom prst="rect">
             <a:avLst/>
@@ -5965,7 +6152,7 @@
     </p:spTree>
     <p:extLst>
       <p:ext uri="{BB962C8B-B14F-4D97-AF65-F5344CB8AC3E}">
-        <p14:creationId xmlns:p14="http://schemas.microsoft.com/office/powerpoint/2010/main" val="1359622288"/>
+        <p14:creationId xmlns:p14="http://schemas.microsoft.com/office/powerpoint/2010/main" val="2011558927"/>
       </p:ext>
     </p:extLst>
   </p:cSld>
@@ -6001,13 +6188,7 @@
       </p:grpSpPr>
       <p:sp>
         <p:nvSpPr>
-          <p:cNvPr id="2" name="Title 1">
-            <a:extLst>
-              <a:ext uri="{FF2B5EF4-FFF2-40B4-BE49-F238E27FC236}">
-                <a16:creationId xmlns:a16="http://schemas.microsoft.com/office/drawing/2014/main" id="{B314D980-B141-DB4D-9B0A-7AA3150AF5F4}"/>
-              </a:ext>
-            </a:extLst>
-          </p:cNvPr>
+          <p:cNvPr id="2" name="標題 1"/>
           <p:cNvSpPr>
             <a:spLocks noGrp="1"/>
           </p:cNvSpPr>
@@ -6021,22 +6202,74 @@
           <a:lstStyle/>
           <a:p>
             <a:r>
-              <a:rPr lang="zh-CN" altLang="en-US" b="1" dirty="0"/>
-              <a:t>實驗結果</a:t>
-            </a:r>
-            <a:endParaRPr lang="en-US" altLang="zh-CN" b="1" dirty="0"/>
-          </a:p>
-        </p:txBody>
-      </p:sp>
-      <p:sp>
-        <p:nvSpPr>
-          <p:cNvPr id="3" name="Content Placeholder 2">
-            <a:extLst>
-              <a:ext uri="{FF2B5EF4-FFF2-40B4-BE49-F238E27FC236}">
-                <a16:creationId xmlns:a16="http://schemas.microsoft.com/office/drawing/2014/main" id="{97F7C985-F283-3F42-A334-D18BFB328D95}"/>
-              </a:ext>
-            </a:extLst>
-          </p:cNvPr>
+              <a:rPr lang="zh-CN" altLang="en-US" b="1" dirty="0">
+                <a:solidFill>
+                  <a:prstClr val="black"/>
+                </a:solidFill>
+              </a:rPr>
+              <a:t>實驗方法</a:t>
+            </a:r>
+            <a:r>
+              <a:rPr lang="en-US" altLang="zh-CN" b="1" dirty="0">
+                <a:solidFill>
+                  <a:prstClr val="black"/>
+                </a:solidFill>
+              </a:rPr>
+              <a:t/>
+            </a:r>
+            <a:br>
+              <a:rPr lang="en-US" altLang="zh-CN" b="1" dirty="0">
+                <a:solidFill>
+                  <a:prstClr val="black"/>
+                </a:solidFill>
+              </a:rPr>
+            </a:br>
+            <a:r>
+              <a:rPr lang="en-US" altLang="zh-CN" sz="1300" b="1" dirty="0">
+                <a:solidFill>
+                  <a:prstClr val="black"/>
+                </a:solidFill>
+              </a:rPr>
+              <a:t/>
+            </a:r>
+            <a:br>
+              <a:rPr lang="en-US" altLang="zh-CN" sz="1300" b="1" dirty="0">
+                <a:solidFill>
+                  <a:prstClr val="black"/>
+                </a:solidFill>
+              </a:rPr>
+            </a:br>
+            <a:r>
+              <a:rPr lang="zh-CN" altLang="en-US" sz="2000" b="1" dirty="0">
+                <a:solidFill>
+                  <a:prstClr val="black"/>
+                </a:solidFill>
+              </a:rPr>
+              <a:t>模型</a:t>
+            </a:r>
+            <a:r>
+              <a:rPr lang="zh-TW" altLang="en-US" sz="2000" b="1" dirty="0">
+                <a:solidFill>
+                  <a:prstClr val="black"/>
+                </a:solidFill>
+              </a:rPr>
+              <a:t> </a:t>
+            </a:r>
+            <a:r>
+              <a:rPr lang="en-US" altLang="zh-TW" sz="2000" b="1" dirty="0">
+                <a:solidFill>
+                  <a:prstClr val="black"/>
+                </a:solidFill>
+              </a:rPr>
+              <a:t>– logistic regression (FINAL</a:t>
+            </a:r>
+            <a:endParaRPr lang="zh-TW" altLang="en-US" dirty="0"/>
+          </a:p>
+        </p:txBody>
+      </p:sp>
+      <p:sp>
+        <p:nvSpPr>
+          <p:cNvPr id="3" name="內容版面配置區 2"/>
           <p:cNvSpPr>
             <a:spLocks noGrp="1"/>
           </p:cNvSpPr>
@@ -6046,23 +6279,287 @@
         </p:nvSpPr>
         <p:spPr/>
         <p:txBody>
-          <a:bodyPr/>
-          <a:lstStyle/>
-          <a:p>
-            <a:endParaRPr lang="en-TW"/>
-          </a:p>
-        </p:txBody>
-      </p:sp>
+          <a:bodyPr>
+            <a:normAutofit fontScale="92500" lnSpcReduction="10000"/>
+          </a:bodyPr>
+          <a:lstStyle/>
+          <a:p>
+            <a:r>
+              <a:rPr lang="en-US" altLang="zh-TW" dirty="0" smtClean="0"/>
+              <a:t>Other tries:</a:t>
+            </a:r>
+          </a:p>
+          <a:p>
+            <a:pPr lvl="1"/>
+            <a:r>
+              <a:rPr lang="en-US" altLang="zh-TW" dirty="0" smtClean="0"/>
+              <a:t>Change the seed used to shuffle the data order</a:t>
+            </a:r>
+          </a:p>
+          <a:p>
+            <a:endParaRPr lang="en-US" altLang="zh-TW" dirty="0"/>
+          </a:p>
+          <a:p>
+            <a:endParaRPr lang="en-US" altLang="zh-TW" dirty="0" smtClean="0"/>
+          </a:p>
+          <a:p>
+            <a:endParaRPr lang="en-US" altLang="zh-TW" dirty="0"/>
+          </a:p>
+          <a:p>
+            <a:endParaRPr lang="en-US" altLang="zh-TW" dirty="0" smtClean="0"/>
+          </a:p>
+          <a:p>
+            <a:endParaRPr lang="en-US" altLang="zh-TW" dirty="0"/>
+          </a:p>
+          <a:p>
+            <a:r>
+              <a:rPr lang="en-US" altLang="zh-TW" dirty="0" smtClean="0">
+                <a:solidFill>
+                  <a:srgbClr val="FF0000"/>
+                </a:solidFill>
+              </a:rPr>
+              <a:t>The way we cut into fold is important, it can be </a:t>
+            </a:r>
+            <a:r>
+              <a:rPr lang="en-US" altLang="zh-TW" dirty="0" smtClean="0">
+                <a:solidFill>
+                  <a:srgbClr val="FF0000"/>
+                </a:solidFill>
+              </a:rPr>
+              <a:t>improved if we make some tricks before cut</a:t>
+            </a:r>
+            <a:endParaRPr lang="zh-TW" altLang="en-US" dirty="0">
+              <a:solidFill>
+                <a:srgbClr val="FF0000"/>
+              </a:solidFill>
+            </a:endParaRPr>
+          </a:p>
+        </p:txBody>
+      </p:sp>
+      <p:graphicFrame>
+        <p:nvGraphicFramePr>
+          <p:cNvPr id="5" name="表格 4"/>
+          <p:cNvGraphicFramePr>
+            <a:graphicFrameLocks noGrp="1"/>
+          </p:cNvGraphicFramePr>
+          <p:nvPr>
+            <p:extLst>
+              <p:ext uri="{D42A27DB-BD31-4B8C-83A1-F6EECF244321}">
+                <p14:modId xmlns:p14="http://schemas.microsoft.com/office/powerpoint/2010/main" val="700339084"/>
+              </p:ext>
+            </p:extLst>
+          </p:nvPr>
+        </p:nvGraphicFramePr>
+        <p:xfrm>
+          <a:off x="5295153" y="3298004"/>
+          <a:ext cx="5400000" cy="1112520"/>
+        </p:xfrm>
+        <a:graphic>
+          <a:graphicData uri="http://schemas.openxmlformats.org/drawingml/2006/table">
+            <a:tbl>
+              <a:tblPr firstRow="1" bandRow="1">
+                <a:tableStyleId>{5C22544A-7EE6-4342-B048-85BDC9FD1C3A}</a:tableStyleId>
+              </a:tblPr>
+              <a:tblGrid>
+                <a:gridCol w="1800000">
+                  <a:extLst>
+                    <a:ext uri="{9D8B030D-6E8A-4147-A177-3AD203B41FA5}">
+                      <a16:colId xmlns:a16="http://schemas.microsoft.com/office/drawing/2014/main" val="621041718"/>
+                    </a:ext>
+                  </a:extLst>
+                </a:gridCol>
+                <a:gridCol w="1800000">
+                  <a:extLst>
+                    <a:ext uri="{9D8B030D-6E8A-4147-A177-3AD203B41FA5}">
+                      <a16:colId xmlns:a16="http://schemas.microsoft.com/office/drawing/2014/main" val="13582020"/>
+                    </a:ext>
+                  </a:extLst>
+                </a:gridCol>
+                <a:gridCol w="1800000">
+                  <a:extLst>
+                    <a:ext uri="{9D8B030D-6E8A-4147-A177-3AD203B41FA5}">
+                      <a16:colId xmlns:a16="http://schemas.microsoft.com/office/drawing/2014/main" val="89510853"/>
+                    </a:ext>
+                  </a:extLst>
+                </a:gridCol>
+              </a:tblGrid>
+              <a:tr h="370840">
+                <a:tc>
+                  <a:txBody>
+                    <a:bodyPr/>
+                    <a:lstStyle/>
+                    <a:p>
+                      <a:pPr algn="ctr"/>
+                      <a:r>
+                        <a:rPr lang="en-US" altLang="zh-TW" dirty="0" smtClean="0"/>
+                        <a:t>seed</a:t>
+                      </a:r>
+                      <a:endParaRPr lang="zh-TW" altLang="en-US" dirty="0"/>
+                    </a:p>
+                  </a:txBody>
+                  <a:tcPr/>
+                </a:tc>
+                <a:tc>
+                  <a:txBody>
+                    <a:bodyPr/>
+                    <a:lstStyle/>
+                    <a:p>
+                      <a:pPr algn="ctr"/>
+                      <a:r>
+                        <a:rPr lang="en-US" altLang="zh-TW" dirty="0" smtClean="0"/>
+                        <a:t>public score</a:t>
+                      </a:r>
+                      <a:endParaRPr lang="zh-TW" altLang="en-US" dirty="0"/>
+                    </a:p>
+                  </a:txBody>
+                  <a:tcPr/>
+                </a:tc>
+                <a:tc>
+                  <a:txBody>
+                    <a:bodyPr/>
+                    <a:lstStyle/>
+                    <a:p>
+                      <a:pPr algn="ctr"/>
+                      <a:r>
+                        <a:rPr lang="en-US" altLang="zh-TW" dirty="0" smtClean="0"/>
+                        <a:t>private score</a:t>
+                      </a:r>
+                      <a:endParaRPr lang="zh-TW" altLang="en-US" dirty="0"/>
+                    </a:p>
+                  </a:txBody>
+                  <a:tcPr/>
+                </a:tc>
+                <a:extLst>
+                  <a:ext uri="{0D108BD9-81ED-4DB2-BD59-A6C34878D82A}">
+                    <a16:rowId xmlns:a16="http://schemas.microsoft.com/office/drawing/2014/main" val="2668263753"/>
+                  </a:ext>
+                </a:extLst>
+              </a:tr>
+              <a:tr h="370840">
+                <a:tc>
+                  <a:txBody>
+                    <a:bodyPr/>
+                    <a:lstStyle/>
+                    <a:p>
+                      <a:pPr algn="ctr"/>
+                      <a:r>
+                        <a:rPr lang="en-US" altLang="zh-TW" dirty="0" smtClean="0"/>
+                        <a:t>4</a:t>
+                      </a:r>
+                      <a:endParaRPr lang="zh-TW" altLang="en-US" dirty="0"/>
+                    </a:p>
+                  </a:txBody>
+                  <a:tcPr/>
+                </a:tc>
+                <a:tc>
+                  <a:txBody>
+                    <a:bodyPr/>
+                    <a:lstStyle/>
+                    <a:p>
+                      <a:pPr algn="ctr"/>
+                      <a:r>
+                        <a:rPr lang="en-US" altLang="zh-TW" dirty="0" smtClean="0"/>
+                        <a:t>0.86792</a:t>
+                      </a:r>
+                      <a:endParaRPr lang="zh-TW" altLang="en-US" dirty="0"/>
+                    </a:p>
+                  </a:txBody>
+                  <a:tcPr/>
+                </a:tc>
+                <a:tc>
+                  <a:txBody>
+                    <a:bodyPr/>
+                    <a:lstStyle/>
+                    <a:p>
+                      <a:pPr algn="ctr"/>
+                      <a:r>
+                        <a:rPr lang="en-US" altLang="zh-TW" dirty="0" smtClean="0"/>
+                        <a:t>0.90909</a:t>
+                      </a:r>
+                      <a:endParaRPr lang="zh-TW" altLang="en-US" dirty="0"/>
+                    </a:p>
+                  </a:txBody>
+                  <a:tcPr/>
+                </a:tc>
+                <a:extLst>
+                  <a:ext uri="{0D108BD9-81ED-4DB2-BD59-A6C34878D82A}">
+                    <a16:rowId xmlns:a16="http://schemas.microsoft.com/office/drawing/2014/main" val="1958668710"/>
+                  </a:ext>
+                </a:extLst>
+              </a:tr>
+              <a:tr h="370840">
+                <a:tc>
+                  <a:txBody>
+                    <a:bodyPr/>
+                    <a:lstStyle/>
+                    <a:p>
+                      <a:pPr algn="ctr"/>
+                      <a:r>
+                        <a:rPr lang="en-US" altLang="zh-TW" dirty="0" smtClean="0"/>
+                        <a:t>10</a:t>
+                      </a:r>
+                      <a:endParaRPr lang="zh-TW" altLang="en-US" dirty="0"/>
+                    </a:p>
+                  </a:txBody>
+                  <a:tcPr/>
+                </a:tc>
+                <a:tc>
+                  <a:txBody>
+                    <a:bodyPr/>
+                    <a:lstStyle/>
+                    <a:p>
+                      <a:pPr algn="ctr"/>
+                      <a:r>
+                        <a:rPr lang="en-US" altLang="zh-TW" dirty="0" smtClean="0"/>
+                        <a:t>0.83018</a:t>
+                      </a:r>
+                      <a:endParaRPr lang="zh-TW" altLang="en-US" dirty="0"/>
+                    </a:p>
+                  </a:txBody>
+                  <a:tcPr/>
+                </a:tc>
+                <a:tc>
+                  <a:txBody>
+                    <a:bodyPr/>
+                    <a:lstStyle/>
+                    <a:p>
+                      <a:pPr algn="ctr"/>
+                      <a:r>
+                        <a:rPr lang="en-US" altLang="zh-TW" dirty="0" smtClean="0"/>
+                        <a:t>0.81818</a:t>
+                      </a:r>
+                      <a:endParaRPr lang="zh-TW" altLang="en-US" dirty="0"/>
+                    </a:p>
+                  </a:txBody>
+                  <a:tcPr/>
+                </a:tc>
+                <a:extLst>
+                  <a:ext uri="{0D108BD9-81ED-4DB2-BD59-A6C34878D82A}">
+                    <a16:rowId xmlns:a16="http://schemas.microsoft.com/office/drawing/2014/main" val="3083832168"/>
+                  </a:ext>
+                </a:extLst>
+              </a:tr>
+            </a:tbl>
+          </a:graphicData>
+        </a:graphic>
+      </p:graphicFrame>
     </p:spTree>
     <p:extLst>
       <p:ext uri="{BB962C8B-B14F-4D97-AF65-F5344CB8AC3E}">
-        <p14:creationId xmlns:p14="http://schemas.microsoft.com/office/powerpoint/2010/main" val="1293020702"/>
+        <p14:creationId xmlns:p14="http://schemas.microsoft.com/office/powerpoint/2010/main" val="1359622288"/>
       </p:ext>
     </p:extLst>
   </p:cSld>
   <p:clrMapOvr>
     <a:masterClrMapping/>
   </p:clrMapOvr>
+  <p:timing>
+    <p:tnLst>
+      <p:par>
+        <p:cTn id="1" dur="indefinite" restart="never" nodeType="tmRoot"/>
+      </p:par>
+    </p:tnLst>
+  </p:timing>
 </p:sld>
 </file>
 
@@ -6854,10 +7351,18 @@
                   <a:prstClr val="black"/>
                 </a:solidFill>
               </a:rPr>
-              <a:t>實驗方法</a:t>
-            </a:r>
-            <a:r>
-              <a:rPr lang="en-US" altLang="zh-CN" b="1" dirty="0">
+              <a:t>實驗</a:t>
+            </a:r>
+            <a:r>
+              <a:rPr lang="zh-CN" altLang="en-US" b="1" dirty="0" smtClean="0">
+                <a:solidFill>
+                  <a:prstClr val="black"/>
+                </a:solidFill>
+              </a:rPr>
+              <a:t>方法</a:t>
+            </a:r>
+            <a:r>
+              <a:rPr lang="en-US" altLang="zh-CN" b="1" dirty="0" smtClean="0">
                 <a:solidFill>
                   <a:prstClr val="black"/>
                 </a:solidFill>
@@ -6865,14 +7370,14 @@
               <a:t/>
             </a:r>
             <a:br>
-              <a:rPr lang="en-US" altLang="zh-CN" b="1" dirty="0">
+              <a:rPr lang="en-US" altLang="zh-CN" b="1" dirty="0" smtClean="0">
                 <a:solidFill>
                   <a:prstClr val="black"/>
                 </a:solidFill>
               </a:rPr>
             </a:br>
             <a:r>
-              <a:rPr lang="en-US" altLang="zh-CN" sz="1300" b="1" dirty="0">
+              <a:rPr lang="en-US" altLang="zh-CN" sz="1300" b="1" dirty="0" smtClean="0">
                 <a:solidFill>
                   <a:prstClr val="black"/>
                 </a:solidFill>
@@ -6880,136 +7385,211 @@
               <a:t/>
             </a:r>
             <a:br>
-              <a:rPr lang="en-US" altLang="zh-CN" sz="1300" b="1" dirty="0">
+              <a:rPr lang="en-US" altLang="zh-CN" sz="1300" b="1" dirty="0" smtClean="0">
                 <a:solidFill>
                   <a:prstClr val="black"/>
                 </a:solidFill>
               </a:rPr>
             </a:br>
             <a:r>
-              <a:rPr lang="zh-CN" altLang="en-US" sz="2000" b="1" dirty="0">
+              <a:rPr lang="zh-CN" altLang="en-US" sz="2000" b="1" dirty="0" smtClean="0">
                 <a:solidFill>
                   <a:prstClr val="black"/>
                 </a:solidFill>
               </a:rPr>
-              <a:t>模型</a:t>
-            </a:r>
-            <a:r>
-              <a:rPr lang="zh-TW" altLang="en-US" sz="2000" b="1" dirty="0">
+              <a:t>模型 </a:t>
+            </a:r>
+            <a:r>
+              <a:rPr lang="en-US" altLang="zh-CN" sz="2000" b="1" dirty="0" smtClean="0">
                 <a:solidFill>
                   <a:prstClr val="black"/>
                 </a:solidFill>
               </a:rPr>
-              <a:t> </a:t>
-            </a:r>
-            <a:r>
-              <a:rPr lang="en-US" altLang="zh-TW" sz="2000" b="1" dirty="0">
-                <a:solidFill>
-                  <a:prstClr val="black"/>
-                </a:solidFill>
-              </a:rPr>
-              <a:t>– logistic regression </a:t>
+              <a:t>– brief Intro</a:t>
             </a:r>
             <a:endParaRPr lang="zh-TW" altLang="en-US" dirty="0"/>
           </a:p>
         </p:txBody>
       </p:sp>
-      <p:sp>
-        <p:nvSpPr>
-          <p:cNvPr id="6" name="內容版面配置區 5"/>
-          <p:cNvSpPr>
-            <a:spLocks noGrp="1"/>
-          </p:cNvSpPr>
-          <p:nvPr>
-            <p:ph idx="1"/>
-          </p:nvPr>
-        </p:nvSpPr>
-        <p:spPr/>
-        <p:txBody>
-          <a:bodyPr/>
-          <a:lstStyle/>
-          <a:p>
-            <a:r>
-              <a:rPr lang="en-US" altLang="zh-TW" dirty="0" smtClean="0"/>
-              <a:t> with all </a:t>
-            </a:r>
-            <a:r>
-              <a:rPr lang="en-US" altLang="zh-TW" dirty="0" err="1" smtClean="0"/>
-              <a:t>fearures</a:t>
-            </a:r>
-            <a:r>
-              <a:rPr lang="en-US" altLang="zh-TW" dirty="0" smtClean="0"/>
-              <a:t>:</a:t>
-            </a:r>
-          </a:p>
-          <a:p>
-            <a:pPr lvl="1"/>
-            <a:r>
-              <a:rPr lang="en-US" altLang="zh-TW" dirty="0" smtClean="0"/>
-              <a:t>  p &lt; 0.05</a:t>
-            </a:r>
-          </a:p>
-          <a:p>
-            <a:pPr lvl="2"/>
-            <a:r>
-              <a:rPr lang="en-US" altLang="zh-TW" dirty="0" err="1" smtClean="0"/>
-              <a:t>chest_pain</a:t>
-            </a:r>
-            <a:endParaRPr lang="en-US" altLang="zh-TW" dirty="0" smtClean="0"/>
-          </a:p>
-          <a:p>
-            <a:pPr lvl="2"/>
-            <a:r>
-              <a:rPr lang="en-US" altLang="zh-TW" dirty="0"/>
-              <a:t>v</a:t>
-            </a:r>
-            <a:r>
-              <a:rPr lang="en-US" altLang="zh-TW" dirty="0" smtClean="0"/>
-              <a:t>essels</a:t>
-            </a:r>
-          </a:p>
-          <a:p>
-            <a:pPr lvl="2"/>
-            <a:r>
-              <a:rPr lang="en-US" altLang="zh-TW" dirty="0" err="1"/>
-              <a:t>t</a:t>
-            </a:r>
-            <a:r>
-              <a:rPr lang="en-US" altLang="zh-TW" dirty="0" err="1" smtClean="0"/>
-              <a:t>halium_scan</a:t>
-            </a:r>
-            <a:r>
-              <a:rPr lang="en-US" altLang="zh-TW" dirty="0" smtClean="0"/>
-              <a:t> </a:t>
-            </a:r>
-            <a:endParaRPr lang="zh-TW" altLang="en-US" dirty="0"/>
-          </a:p>
-        </p:txBody>
-      </p:sp>
-      <p:pic>
-        <p:nvPicPr>
-          <p:cNvPr id="7" name="內容版面配置區 3"/>
-          <p:cNvPicPr>
-            <a:picLocks noChangeAspect="1"/>
-          </p:cNvPicPr>
-          <p:nvPr/>
-        </p:nvPicPr>
-        <p:blipFill>
-          <a:blip r:embed="rId2"/>
-          <a:stretch>
-            <a:fillRect/>
-          </a:stretch>
-        </p:blipFill>
-        <p:spPr>
-          <a:xfrm>
-            <a:off x="6423328" y="2015732"/>
-            <a:ext cx="4631526" cy="3449638"/>
-          </a:xfrm>
-          <a:prstGeom prst="rect">
-            <a:avLst/>
-          </a:prstGeom>
-        </p:spPr>
-      </p:pic>
+      <mc:AlternateContent xmlns:mc="http://schemas.openxmlformats.org/markup-compatibility/2006">
+        <mc:Choice xmlns:a14="http://schemas.microsoft.com/office/drawing/2010/main" Requires="a14">
+          <p:sp>
+            <p:nvSpPr>
+              <p:cNvPr id="6" name="內容版面配置區 5"/>
+              <p:cNvSpPr>
+                <a:spLocks noGrp="1"/>
+              </p:cNvSpPr>
+              <p:nvPr>
+                <p:ph idx="1"/>
+              </p:nvPr>
+            </p:nvSpPr>
+            <p:spPr/>
+            <p:txBody>
+              <a:bodyPr/>
+              <a:lstStyle/>
+              <a:p>
+                <a:pPr marL="228600" lvl="2">
+                  <a:spcBef>
+                    <a:spcPts val="1000"/>
+                  </a:spcBef>
+                </a:pPr>
+                <a:r>
+                  <a:rPr lang="en-US" altLang="zh-TW" sz="2000" dirty="0" smtClean="0"/>
+                  <a:t>M</a:t>
+                </a:r>
+                <a:r>
+                  <a:rPr lang="en" altLang="zh-TW" sz="2000" dirty="0" smtClean="0"/>
+                  <a:t>odeling process:</a:t>
+                </a:r>
+              </a:p>
+              <a:p>
+                <a:pPr marL="685800" lvl="3">
+                  <a:spcBef>
+                    <a:spcPts val="1000"/>
+                  </a:spcBef>
+                </a:pPr>
+                <a:r>
+                  <a:rPr lang="en-US" altLang="zh-TW" sz="1800" dirty="0"/>
+                  <a:t>p</a:t>
+                </a:r>
+                <a:r>
+                  <a:rPr lang="en" altLang="zh-TW" sz="1800" dirty="0" smtClean="0"/>
+                  <a:t>erform </a:t>
+                </a:r>
+                <a:r>
+                  <a:rPr lang="en" altLang="zh-TW" sz="1800" dirty="0"/>
+                  <a:t>evaluation </a:t>
+                </a:r>
+                <a:r>
+                  <a:rPr lang="en" altLang="zh-TW" sz="1800" dirty="0" smtClean="0"/>
+                  <a:t>by k –fold cross validation ( k </a:t>
+                </a:r>
+                <a14:m>
+                  <m:oMath xmlns:m="http://schemas.openxmlformats.org/officeDocument/2006/math">
+                    <m:r>
+                      <a:rPr lang="en" altLang="zh-TW" sz="1800" i="1" dirty="0" smtClean="0">
+                        <a:latin typeface="Cambria Math" panose="02040503050406030204" pitchFamily="18" charset="0"/>
+                      </a:rPr>
+                      <m:t>∈</m:t>
+                    </m:r>
+                    <m:d>
+                      <m:dPr>
+                        <m:begChr m:val="["/>
+                        <m:endChr m:val="]"/>
+                        <m:ctrlPr>
+                          <a:rPr lang="en-US" altLang="zh-TW" sz="1800" b="0" i="0" dirty="0" smtClean="0">
+                            <a:latin typeface="Cambria Math" panose="02040503050406030204" pitchFamily="18" charset="0"/>
+                          </a:rPr>
+                        </m:ctrlPr>
+                      </m:dPr>
+                      <m:e>
+                        <m:r>
+                          <a:rPr lang="en-US" altLang="zh-TW" sz="1800" b="0" i="0" dirty="0" smtClean="0">
+                            <a:latin typeface="Cambria Math" panose="02040503050406030204" pitchFamily="18" charset="0"/>
+                          </a:rPr>
+                          <m:t>5,10</m:t>
+                        </m:r>
+                      </m:e>
+                    </m:d>
+                    <m:r>
+                      <a:rPr lang="en-US" altLang="zh-TW" sz="1800" b="0" i="0" dirty="0" smtClean="0">
+                        <a:latin typeface="Cambria Math" panose="02040503050406030204" pitchFamily="18" charset="0"/>
+                      </a:rPr>
+                      <m:t> </m:t>
+                    </m:r>
+                  </m:oMath>
+                </a14:m>
+                <a:r>
+                  <a:rPr lang="en-US" altLang="zh-TW" sz="1800" dirty="0" smtClean="0"/>
+                  <a:t>)</a:t>
+                </a:r>
+                <a:endParaRPr lang="zh-TW" altLang="en-US" sz="1800" dirty="0"/>
+              </a:p>
+              <a:p>
+                <a:pPr lvl="1"/>
+                <a:r>
+                  <a:rPr lang="en-US" altLang="zh-TW" dirty="0"/>
+                  <a:t>c</a:t>
+                </a:r>
+                <a:r>
+                  <a:rPr lang="en-US" altLang="zh-TW" dirty="0" smtClean="0"/>
+                  <a:t>hoose </a:t>
+                </a:r>
+                <a:r>
+                  <a:rPr lang="en-US" altLang="zh-TW" dirty="0"/>
+                  <a:t>model by </a:t>
+                </a:r>
+                <a:r>
+                  <a:rPr lang="en-US" altLang="zh-TW" dirty="0" smtClean="0"/>
+                  <a:t>evaluating test fold’s accuracy</a:t>
+                </a:r>
+              </a:p>
+              <a:p>
+                <a:pPr lvl="1"/>
+                <a:r>
+                  <a:rPr lang="en-US" altLang="zh-TW" dirty="0" smtClean="0"/>
+                  <a:t>Method1:</a:t>
+                </a:r>
+              </a:p>
+              <a:p>
+                <a:pPr lvl="2"/>
+                <a:r>
+                  <a:rPr lang="en-US" altLang="zh-TW" dirty="0" smtClean="0"/>
+                  <a:t>Logistic regression</a:t>
+                </a:r>
+              </a:p>
+              <a:p>
+                <a:pPr lvl="1"/>
+                <a:r>
+                  <a:rPr lang="en-US" altLang="zh-TW" dirty="0" smtClean="0"/>
+                  <a:t>Method II:</a:t>
+                </a:r>
+              </a:p>
+              <a:p>
+                <a:pPr lvl="2"/>
+                <a:r>
+                  <a:rPr lang="en-US" altLang="zh-TW" dirty="0" err="1" smtClean="0"/>
+                  <a:t>xgboost</a:t>
+                </a:r>
+                <a:endParaRPr lang="en-US" altLang="zh-TW" dirty="0"/>
+              </a:p>
+            </p:txBody>
+          </p:sp>
+        </mc:Choice>
+        <mc:Fallback>
+          <p:sp>
+            <p:nvSpPr>
+              <p:cNvPr id="6" name="內容版面配置區 5"/>
+              <p:cNvSpPr>
+                <a:spLocks noGrp="1" noRot="1" noChangeAspect="1" noMove="1" noResize="1" noEditPoints="1" noAdjustHandles="1" noChangeArrowheads="1" noChangeShapeType="1" noTextEdit="1"/>
+              </p:cNvSpPr>
+              <p:nvPr>
+                <p:ph idx="1"/>
+              </p:nvPr>
+            </p:nvSpPr>
+            <p:spPr>
+              <a:blipFill>
+                <a:blip r:embed="rId2"/>
+                <a:stretch>
+                  <a:fillRect l="-571" t="-177"/>
+                </a:stretch>
+              </a:blipFill>
+            </p:spPr>
+            <p:txBody>
+              <a:bodyPr/>
+              <a:lstStyle/>
+              <a:p>
+                <a:r>
+                  <a:rPr lang="zh-TW" altLang="en-US">
+                    <a:noFill/>
+                  </a:rPr>
+                  <a:t> </a:t>
+                </a:r>
+              </a:p>
+            </p:txBody>
+          </p:sp>
+        </mc:Fallback>
+      </mc:AlternateContent>
     </p:spTree>
     <p:extLst>
       <p:ext uri="{BB962C8B-B14F-4D97-AF65-F5344CB8AC3E}">
@@ -7147,70 +7727,81 @@
           <a:p>
             <a:r>
               <a:rPr lang="en-US" altLang="zh-TW" dirty="0" smtClean="0"/>
-              <a:t> baseline: (after some try)</a:t>
+              <a:t> with all </a:t>
+            </a:r>
+            <a:r>
+              <a:rPr lang="en-US" altLang="zh-TW" dirty="0" err="1" smtClean="0"/>
+              <a:t>fearures</a:t>
+            </a:r>
+            <a:r>
+              <a:rPr lang="en-US" altLang="zh-TW" dirty="0" smtClean="0"/>
+              <a:t>:</a:t>
             </a:r>
           </a:p>
           <a:p>
             <a:pPr lvl="1"/>
             <a:r>
               <a:rPr lang="en-US" altLang="zh-TW" dirty="0" smtClean="0"/>
-              <a:t>feature </a:t>
-            </a:r>
+              <a:t>  p &lt; 0.05</a:t>
+            </a:r>
+          </a:p>
+          <a:p>
+            <a:pPr lvl="2"/>
+            <a:r>
+              <a:rPr lang="en-US" altLang="zh-TW" dirty="0" err="1" smtClean="0"/>
+              <a:t>chest_pain</a:t>
+            </a:r>
+            <a:endParaRPr lang="en-US" altLang="zh-TW" dirty="0" smtClean="0"/>
+          </a:p>
+          <a:p>
+            <a:pPr lvl="2"/>
             <a:r>
               <a:rPr lang="en-US" altLang="zh-TW" dirty="0"/>
-              <a:t>=&gt; </a:t>
-            </a:r>
-            <a:r>
-              <a:rPr lang="en-US" altLang="zh-TW" dirty="0" err="1"/>
-              <a:t>chest_pain+vessels+thalium_scan+resting_bp+max_rate</a:t>
-            </a:r>
-            <a:r>
-              <a:rPr lang="en-US" altLang="zh-TW" dirty="0"/>
-              <a:t> </a:t>
+              <a:t>v</a:t>
             </a:r>
             <a:r>
               <a:rPr lang="en-US" altLang="zh-TW" dirty="0" smtClean="0"/>
-              <a:t>(without doing any thing</a:t>
-            </a:r>
-          </a:p>
-          <a:p>
-            <a:pPr lvl="1"/>
-            <a:r>
-              <a:rPr lang="en-US" altLang="zh-TW" dirty="0" smtClean="0"/>
-              <a:t>Public score</a:t>
-            </a:r>
-            <a:r>
-              <a:rPr lang="en-US" altLang="zh-TW" dirty="0"/>
-              <a:t>: 0.86363</a:t>
-            </a:r>
-          </a:p>
-          <a:p>
-            <a:pPr lvl="1"/>
-            <a:r>
-              <a:rPr lang="en-US" altLang="zh-TW" dirty="0" smtClean="0"/>
-              <a:t>Private score: 0.75471</a:t>
-            </a:r>
-          </a:p>
-          <a:p>
-            <a:pPr lvl="1"/>
+              <a:t>essels</a:t>
+            </a:r>
+          </a:p>
+          <a:p>
+            <a:pPr lvl="2"/>
+            <a:r>
+              <a:rPr lang="en-US" altLang="zh-TW" dirty="0" err="1" smtClean="0"/>
+              <a:t>thalium_scan</a:t>
+            </a:r>
             <a:endParaRPr lang="en-US" altLang="zh-TW" dirty="0" smtClean="0"/>
           </a:p>
-          <a:p>
-            <a:pPr marL="457200" lvl="1" indent="0">
-              <a:buNone/>
-            </a:pPr>
-            <a:r>
-              <a:rPr lang="en-US" altLang="zh-TW" dirty="0" smtClean="0"/>
-              <a:t>   </a:t>
-            </a:r>
-            <a:endParaRPr lang="zh-TW" altLang="en-US" dirty="0"/>
-          </a:p>
-        </p:txBody>
-      </p:sp>
+        </p:txBody>
+      </p:sp>
+      <p:pic>
+        <p:nvPicPr>
+          <p:cNvPr id="7" name="內容版面配置區 3"/>
+          <p:cNvPicPr>
+            <a:picLocks noChangeAspect="1"/>
+          </p:cNvPicPr>
+          <p:nvPr/>
+        </p:nvPicPr>
+        <p:blipFill>
+          <a:blip r:embed="rId2"/>
+          <a:stretch>
+            <a:fillRect/>
+          </a:stretch>
+        </p:blipFill>
+        <p:spPr>
+          <a:xfrm>
+            <a:off x="5985865" y="2015732"/>
+            <a:ext cx="5068989" cy="3775468"/>
+          </a:xfrm>
+          <a:prstGeom prst="rect">
+            <a:avLst/>
+          </a:prstGeom>
+        </p:spPr>
+      </p:pic>
     </p:spTree>
     <p:extLst>
       <p:ext uri="{BB962C8B-B14F-4D97-AF65-F5344CB8AC3E}">
-        <p14:creationId xmlns:p14="http://schemas.microsoft.com/office/powerpoint/2010/main" val="924524587"/>
+        <p14:creationId xmlns:p14="http://schemas.microsoft.com/office/powerpoint/2010/main" val="1923217805"/>
       </p:ext>
     </p:extLst>
   </p:cSld>
@@ -7344,8 +7935,13 @@
           <a:p>
             <a:r>
               <a:rPr lang="en-US" altLang="zh-TW" dirty="0" smtClean="0"/>
-              <a:t>Process :  (a small mistake, so only train fold one data by 5 fold)</a:t>
-            </a:r>
+              <a:t> </a:t>
+            </a:r>
+            <a:r>
+              <a:rPr lang="en-US" altLang="zh-TW" dirty="0"/>
+              <a:t>baseline: </a:t>
+            </a:r>
+            <a:endParaRPr lang="en-US" altLang="zh-TW" dirty="0" smtClean="0"/>
           </a:p>
           <a:p>
             <a:pPr lvl="1"/>
@@ -7353,16 +7949,39 @@
               <a:rPr lang="en-US" altLang="zh-TW" dirty="0" smtClean="0"/>
               <a:t>feature </a:t>
             </a:r>
-            <a:r>
-              <a:rPr lang="en-US" altLang="zh-TW" dirty="0"/>
-              <a:t>=&gt; </a:t>
-            </a:r>
-            <a:r>
-              <a:rPr lang="en-US" altLang="zh-TW" dirty="0" err="1"/>
-              <a:t>chest_pain+vessels+thalium_scan+resting_bp+max_rate</a:t>
-            </a:r>
-            <a:r>
-              <a:rPr lang="en-US" altLang="zh-TW" dirty="0"/>
+          </a:p>
+          <a:p>
+            <a:pPr lvl="2"/>
+            <a:r>
+              <a:rPr lang="en-US" altLang="zh-TW" dirty="0" err="1" smtClean="0"/>
+              <a:t>chest_pain</a:t>
+            </a:r>
+            <a:r>
+              <a:rPr lang="en-US" altLang="zh-TW" dirty="0" smtClean="0"/>
+              <a:t> + vessels + </a:t>
+            </a:r>
+            <a:r>
+              <a:rPr lang="en-US" altLang="zh-TW" dirty="0" err="1" smtClean="0"/>
+              <a:t>thalium_scan</a:t>
+            </a:r>
+            <a:r>
+              <a:rPr lang="en-US" altLang="zh-TW" dirty="0" smtClean="0"/>
+              <a:t> + </a:t>
+            </a:r>
+            <a:r>
+              <a:rPr lang="en-US" altLang="zh-TW" dirty="0" err="1" smtClean="0"/>
+              <a:t>resting_bp</a:t>
+            </a:r>
+            <a:r>
+              <a:rPr lang="en-US" altLang="zh-TW" dirty="0" smtClean="0"/>
+              <a:t> + </a:t>
+            </a:r>
+            <a:r>
+              <a:rPr lang="en-US" altLang="zh-TW" dirty="0" err="1" smtClean="0"/>
+              <a:t>max_rate</a:t>
+            </a:r>
+            <a:r>
+              <a:rPr lang="en-US" altLang="zh-TW" dirty="0" smtClean="0"/>
               <a:t> </a:t>
             </a:r>
             <a:r>
@@ -7374,7 +7993,11 @@
             <a:pPr lvl="1"/>
             <a:r>
               <a:rPr lang="en-US" altLang="zh-TW" dirty="0" smtClean="0"/>
-              <a:t>Public score</a:t>
+              <a:t>Public </a:t>
+            </a:r>
+            <a:r>
+              <a:rPr lang="en-US" altLang="zh-TW" dirty="0" smtClean="0"/>
+              <a:t>score</a:t>
             </a:r>
             <a:r>
               <a:rPr lang="en-US" altLang="zh-TW" dirty="0"/>
@@ -7385,7 +8008,11 @@
             <a:pPr lvl="1"/>
             <a:r>
               <a:rPr lang="en-US" altLang="zh-TW" dirty="0" smtClean="0"/>
-              <a:t>Private score: 0.83018</a:t>
+              <a:t>Private </a:t>
+            </a:r>
+            <a:r>
+              <a:rPr lang="en-US" altLang="zh-TW" dirty="0" smtClean="0"/>
+              <a:t>score: 0.75471</a:t>
             </a:r>
           </a:p>
           <a:p>
@@ -7407,7 +8034,7 @@
     </p:spTree>
     <p:extLst>
       <p:ext uri="{BB962C8B-B14F-4D97-AF65-F5344CB8AC3E}">
-        <p14:creationId xmlns:p14="http://schemas.microsoft.com/office/powerpoint/2010/main" val="1117646216"/>
+        <p14:creationId xmlns:p14="http://schemas.microsoft.com/office/powerpoint/2010/main" val="924524587"/>
       </p:ext>
     </p:extLst>
   </p:cSld>

</xml_diff>